<commit_message>
added pictures to ppp, worked on design
</commit_message>
<xml_diff>
--- a/Bericht/Presentation.pptx
+++ b/Bericht/Presentation.pptx
@@ -8,10 +8,11 @@
     <p:sldId id="256" r:id="rId2"/>
     <p:sldId id="259" r:id="rId3"/>
     <p:sldId id="257" r:id="rId4"/>
-    <p:sldId id="261" r:id="rId5"/>
-    <p:sldId id="260" r:id="rId6"/>
-    <p:sldId id="262" r:id="rId7"/>
-    <p:sldId id="258" r:id="rId8"/>
+    <p:sldId id="263" r:id="rId5"/>
+    <p:sldId id="261" r:id="rId6"/>
+    <p:sldId id="260" r:id="rId7"/>
+    <p:sldId id="262" r:id="rId8"/>
+    <p:sldId id="258" r:id="rId9"/>
   </p:sldIdLst>
   <p:sldSz cx="12192000" cy="6858000"/>
   <p:notesSz cx="6858000" cy="9144000"/>
@@ -362,7 +363,7 @@
           <a:p>
             <a:fld id="{89598A59-EBF3-46AE-A9FA-23B0DB73E5A7}" type="datetimeFigureOut">
               <a:rPr lang="en-GB" smtClean="0"/>
-              <a:t>25/01/2019</a:t>
+              <a:t>27/01/2019</a:t>
             </a:fld>
             <a:endParaRPr lang="en-GB"/>
           </a:p>
@@ -562,7 +563,7 @@
           <a:p>
             <a:fld id="{89598A59-EBF3-46AE-A9FA-23B0DB73E5A7}" type="datetimeFigureOut">
               <a:rPr lang="en-GB" smtClean="0"/>
-              <a:t>25/01/2019</a:t>
+              <a:t>27/01/2019</a:t>
             </a:fld>
             <a:endParaRPr lang="en-GB"/>
           </a:p>
@@ -772,7 +773,7 @@
           <a:p>
             <a:fld id="{89598A59-EBF3-46AE-A9FA-23B0DB73E5A7}" type="datetimeFigureOut">
               <a:rPr lang="en-GB" smtClean="0"/>
-              <a:t>25/01/2019</a:t>
+              <a:t>27/01/2019</a:t>
             </a:fld>
             <a:endParaRPr lang="en-GB"/>
           </a:p>
@@ -972,7 +973,7 @@
           <a:p>
             <a:fld id="{89598A59-EBF3-46AE-A9FA-23B0DB73E5A7}" type="datetimeFigureOut">
               <a:rPr lang="en-GB" smtClean="0"/>
-              <a:t>25/01/2019</a:t>
+              <a:t>27/01/2019</a:t>
             </a:fld>
             <a:endParaRPr lang="en-GB"/>
           </a:p>
@@ -1248,7 +1249,7 @@
           <a:p>
             <a:fld id="{89598A59-EBF3-46AE-A9FA-23B0DB73E5A7}" type="datetimeFigureOut">
               <a:rPr lang="en-GB" smtClean="0"/>
-              <a:t>25/01/2019</a:t>
+              <a:t>27/01/2019</a:t>
             </a:fld>
             <a:endParaRPr lang="en-GB"/>
           </a:p>
@@ -1516,7 +1517,7 @@
           <a:p>
             <a:fld id="{89598A59-EBF3-46AE-A9FA-23B0DB73E5A7}" type="datetimeFigureOut">
               <a:rPr lang="en-GB" smtClean="0"/>
-              <a:t>25/01/2019</a:t>
+              <a:t>27/01/2019</a:t>
             </a:fld>
             <a:endParaRPr lang="en-GB"/>
           </a:p>
@@ -1931,7 +1932,7 @@
           <a:p>
             <a:fld id="{89598A59-EBF3-46AE-A9FA-23B0DB73E5A7}" type="datetimeFigureOut">
               <a:rPr lang="en-GB" smtClean="0"/>
-              <a:t>25/01/2019</a:t>
+              <a:t>27/01/2019</a:t>
             </a:fld>
             <a:endParaRPr lang="en-GB"/>
           </a:p>
@@ -2073,7 +2074,7 @@
           <a:p>
             <a:fld id="{89598A59-EBF3-46AE-A9FA-23B0DB73E5A7}" type="datetimeFigureOut">
               <a:rPr lang="en-GB" smtClean="0"/>
-              <a:t>25/01/2019</a:t>
+              <a:t>27/01/2019</a:t>
             </a:fld>
             <a:endParaRPr lang="en-GB"/>
           </a:p>
@@ -2186,7 +2187,7 @@
           <a:p>
             <a:fld id="{89598A59-EBF3-46AE-A9FA-23B0DB73E5A7}" type="datetimeFigureOut">
               <a:rPr lang="en-GB" smtClean="0"/>
-              <a:t>25/01/2019</a:t>
+              <a:t>27/01/2019</a:t>
             </a:fld>
             <a:endParaRPr lang="en-GB"/>
           </a:p>
@@ -2499,7 +2500,7 @@
           <a:p>
             <a:fld id="{89598A59-EBF3-46AE-A9FA-23B0DB73E5A7}" type="datetimeFigureOut">
               <a:rPr lang="en-GB" smtClean="0"/>
-              <a:t>25/01/2019</a:t>
+              <a:t>27/01/2019</a:t>
             </a:fld>
             <a:endParaRPr lang="en-GB"/>
           </a:p>
@@ -2788,7 +2789,7 @@
           <a:p>
             <a:fld id="{89598A59-EBF3-46AE-A9FA-23B0DB73E5A7}" type="datetimeFigureOut">
               <a:rPr lang="en-GB" smtClean="0"/>
-              <a:t>25/01/2019</a:t>
+              <a:t>27/01/2019</a:t>
             </a:fld>
             <a:endParaRPr lang="en-GB"/>
           </a:p>
@@ -3031,7 +3032,7 @@
           <a:p>
             <a:fld id="{89598A59-EBF3-46AE-A9FA-23B0DB73E5A7}" type="datetimeFigureOut">
               <a:rPr lang="en-GB" smtClean="0"/>
-              <a:t>25/01/2019</a:t>
+              <a:t>27/01/2019</a:t>
             </a:fld>
             <a:endParaRPr lang="en-GB"/>
           </a:p>
@@ -3458,7 +3459,7 @@
       </p:grpSpPr>
       <p:sp>
         <p:nvSpPr>
-          <p:cNvPr id="8" name="Rectangle 7">
+          <p:cNvPr id="24" name="Rectangle 23">
             <a:extLst>
               <a:ext uri="{FF2B5EF4-FFF2-40B4-BE49-F238E27FC236}">
                 <a16:creationId xmlns:a16="http://schemas.microsoft.com/office/drawing/2014/main" id="{23962611-DFD5-4092-AAFD-559E3DFCE2C9}"/>
@@ -3483,268 +3484,6 @@
           <a:xfrm>
             <a:off x="475488" y="0"/>
             <a:ext cx="10910292" cy="6858000"/>
-          </a:xfrm>
-          <a:prstGeom prst="rect">
-            <a:avLst/>
-          </a:prstGeom>
-          <a:gradFill>
-            <a:gsLst>
-              <a:gs pos="0">
-                <a:schemeClr val="accent1">
-                  <a:lumMod val="90000"/>
-                </a:schemeClr>
-              </a:gs>
-              <a:gs pos="25000">
-                <a:schemeClr val="accent1">
-                  <a:lumMod val="90000"/>
-                </a:schemeClr>
-              </a:gs>
-              <a:gs pos="94000">
-                <a:schemeClr val="bg2">
-                  <a:lumMod val="25000"/>
-                </a:schemeClr>
-              </a:gs>
-              <a:gs pos="100000">
-                <a:schemeClr val="bg2">
-                  <a:lumMod val="25000"/>
-                </a:schemeClr>
-              </a:gs>
-            </a:gsLst>
-            <a:lin ang="4200000" scaled="0"/>
-          </a:gradFill>
-          <a:ln>
-            <a:noFill/>
-          </a:ln>
-        </p:spPr>
-        <p:style>
-          <a:lnRef idx="2">
-            <a:schemeClr val="accent1">
-              <a:shade val="50000"/>
-            </a:schemeClr>
-          </a:lnRef>
-          <a:fillRef idx="1">
-            <a:schemeClr val="accent1"/>
-          </a:fillRef>
-          <a:effectRef idx="0">
-            <a:schemeClr val="accent1"/>
-          </a:effectRef>
-          <a:fontRef idx="minor">
-            <a:schemeClr val="lt1"/>
-          </a:fontRef>
-        </p:style>
-        <p:txBody>
-          <a:bodyPr rtlCol="0" anchor="ctr"/>
-          <a:lstStyle/>
-          <a:p>
-            <a:pPr algn="ctr"/>
-            <a:endParaRPr lang="en-US"/>
-          </a:p>
-        </p:txBody>
-      </p:sp>
-      <p:pic>
-        <p:nvPicPr>
-          <p:cNvPr id="19" name="Picture 9">
-            <a:extLst>
-              <a:ext uri="{FF2B5EF4-FFF2-40B4-BE49-F238E27FC236}">
-                <a16:creationId xmlns:a16="http://schemas.microsoft.com/office/drawing/2014/main" id="{2270F1FA-0425-408F-9861-80BF5AFB276D}"/>
-              </a:ext>
-              <a:ext uri="{C183D7F6-B498-43B3-948B-1728B52AA6E4}">
-                <adec:decorative xmlns:adec="http://schemas.microsoft.com/office/drawing/2017/decorative" val="1"/>
-              </a:ext>
-            </a:extLst>
-          </p:cNvPr>
-          <p:cNvPicPr>
-            <a:picLocks noGrp="1" noRot="1" noChangeAspect="1" noMove="1" noResize="1" noEditPoints="1" noAdjustHandles="1" noChangeArrowheads="1" noChangeShapeType="1" noCrop="1"/>
-          </p:cNvPicPr>
-          <p:nvPr>
-            <p:extLst>
-              <p:ext uri="{386F3935-93C4-4BCD-93E2-E3B085C9AB24}">
-                <p16:designElem xmlns:p16="http://schemas.microsoft.com/office/powerpoint/2015/main" val="1"/>
-              </p:ext>
-            </p:extLst>
-          </p:nvPr>
-        </p:nvPicPr>
-        <p:blipFill>
-          <a:blip r:embed="rId2">
-            <a:extLst>
-              <a:ext uri="{28A0092B-C50C-407E-A947-70E740481C1C}">
-                <a14:useLocalDpi xmlns:a14="http://schemas.microsoft.com/office/drawing/2010/main" val="0"/>
-              </a:ext>
-            </a:extLst>
-          </a:blip>
-          <a:stretch>
-            <a:fillRect/>
-          </a:stretch>
-        </p:blipFill>
-        <p:spPr>
-          <a:xfrm>
-            <a:off x="0" y="0"/>
-            <a:ext cx="12192000" cy="6858000"/>
-          </a:xfrm>
-          <a:prstGeom prst="rect">
-            <a:avLst/>
-          </a:prstGeom>
-        </p:spPr>
-      </p:pic>
-      <p:sp>
-        <p:nvSpPr>
-          <p:cNvPr id="2" name="Titel 1">
-            <a:extLst>
-              <a:ext uri="{FF2B5EF4-FFF2-40B4-BE49-F238E27FC236}">
-                <a16:creationId xmlns:a16="http://schemas.microsoft.com/office/drawing/2014/main" id="{43792654-E2A4-4215-BF89-6A10B27420D4}"/>
-              </a:ext>
-            </a:extLst>
-          </p:cNvPr>
-          <p:cNvSpPr>
-            <a:spLocks noGrp="1"/>
-          </p:cNvSpPr>
-          <p:nvPr>
-            <p:ph type="ctrTitle"/>
-          </p:nvPr>
-        </p:nvSpPr>
-        <p:spPr>
-          <a:xfrm>
-            <a:off x="3045368" y="2043663"/>
-            <a:ext cx="6105194" cy="2031055"/>
-          </a:xfrm>
-        </p:spPr>
-        <p:txBody>
-          <a:bodyPr>
-            <a:normAutofit/>
-          </a:bodyPr>
-          <a:lstStyle/>
-          <a:p>
-            <a:r>
-              <a:rPr lang="en-GB" err="1">
-                <a:solidFill>
-                  <a:srgbClr val="FFFFFF"/>
-                </a:solidFill>
-              </a:rPr>
-              <a:t>LEDtrix</a:t>
-            </a:r>
-            <a:r>
-              <a:rPr lang="en-GB">
-                <a:solidFill>
-                  <a:srgbClr val="FFFFFF"/>
-                </a:solidFill>
-              </a:rPr>
-              <a:t> </a:t>
-            </a:r>
-          </a:p>
-        </p:txBody>
-      </p:sp>
-      <p:sp>
-        <p:nvSpPr>
-          <p:cNvPr id="3" name="Untertitel 2">
-            <a:extLst>
-              <a:ext uri="{FF2B5EF4-FFF2-40B4-BE49-F238E27FC236}">
-                <a16:creationId xmlns:a16="http://schemas.microsoft.com/office/drawing/2014/main" id="{501893E9-0561-4A96-9DAF-014628E62172}"/>
-              </a:ext>
-            </a:extLst>
-          </p:cNvPr>
-          <p:cNvSpPr>
-            <a:spLocks noGrp="1"/>
-          </p:cNvSpPr>
-          <p:nvPr>
-            <p:ph type="subTitle" idx="1"/>
-          </p:nvPr>
-        </p:nvSpPr>
-        <p:spPr>
-          <a:xfrm>
-            <a:off x="3045368" y="4074718"/>
-            <a:ext cx="6105194" cy="682079"/>
-          </a:xfrm>
-        </p:spPr>
-        <p:txBody>
-          <a:bodyPr>
-            <a:normAutofit/>
-          </a:bodyPr>
-          <a:lstStyle/>
-          <a:p>
-            <a:r>
-              <a:rPr lang="en-GB">
-                <a:solidFill>
-                  <a:srgbClr val="FFFFFF"/>
-                </a:solidFill>
-              </a:rPr>
-              <a:t>Maurizio Pasquinelli, Salome Müller</a:t>
-            </a:r>
-          </a:p>
-        </p:txBody>
-      </p:sp>
-    </p:spTree>
-    <p:extLst>
-      <p:ext uri="{BB962C8B-B14F-4D97-AF65-F5344CB8AC3E}">
-        <p14:creationId xmlns:p14="http://schemas.microsoft.com/office/powerpoint/2010/main" val="170765115"/>
-      </p:ext>
-    </p:extLst>
-  </p:cSld>
-  <p:clrMapOvr>
-    <a:masterClrMapping/>
-  </p:clrMapOvr>
-  <mc:AlternateContent xmlns:mc="http://schemas.openxmlformats.org/markup-compatibility/2006" xmlns:p14="http://schemas.microsoft.com/office/powerpoint/2010/main">
-    <mc:Choice Requires="p14">
-      <p:transition spd="slow" p14:dur="2000" advTm="12773"/>
-    </mc:Choice>
-    <mc:Fallback xmlns="">
-      <p:transition spd="slow" advTm="12773"/>
-    </mc:Fallback>
-  </mc:AlternateContent>
-</p:sld>
-</file>
-
-<file path=ppt/slides/slide2.xml><?xml version="1.0" encoding="utf-8"?>
-<p:sld xmlns:a="http://schemas.openxmlformats.org/drawingml/2006/main" xmlns:r="http://schemas.openxmlformats.org/officeDocument/2006/relationships" xmlns:p="http://schemas.openxmlformats.org/presentationml/2006/main">
-  <p:cSld>
-    <p:bg>
-      <p:bgPr>
-        <a:solidFill>
-          <a:schemeClr val="bg1"/>
-        </a:solidFill>
-        <a:effectLst/>
-      </p:bgPr>
-    </p:bg>
-    <p:spTree>
-      <p:nvGrpSpPr>
-        <p:cNvPr id="1" name=""/>
-        <p:cNvGrpSpPr/>
-        <p:nvPr/>
-      </p:nvGrpSpPr>
-      <p:grpSpPr>
-        <a:xfrm>
-          <a:off x="0" y="0"/>
-          <a:ext cx="0" cy="0"/>
-          <a:chOff x="0" y="0"/>
-          <a:chExt cx="0" cy="0"/>
-        </a:xfrm>
-      </p:grpSpPr>
-      <p:sp>
-        <p:nvSpPr>
-          <p:cNvPr id="27" name="Rectangle 14">
-            <a:extLst>
-              <a:ext uri="{FF2B5EF4-FFF2-40B4-BE49-F238E27FC236}">
-                <a16:creationId xmlns:a16="http://schemas.microsoft.com/office/drawing/2014/main" id="{B4F5FA0D-0104-4987-8241-EFF7C85B88DE}"/>
-              </a:ext>
-              <a:ext uri="{C183D7F6-B498-43B3-948B-1728B52AA6E4}">
-                <adec:decorative xmlns:adec="http://schemas.microsoft.com/office/drawing/2017/decorative" val="1"/>
-              </a:ext>
-            </a:extLst>
-          </p:cNvPr>
-          <p:cNvSpPr>
-            <a:spLocks noGrp="1" noRot="1" noChangeAspect="1" noMove="1" noResize="1" noEditPoints="1" noAdjustHandles="1" noChangeArrowheads="1" noChangeShapeType="1" noTextEdit="1"/>
-          </p:cNvSpPr>
-          <p:nvPr>
-            <p:extLst>
-              <p:ext uri="{386F3935-93C4-4BCD-93E2-E3B085C9AB24}">
-                <p16:designElem xmlns:p16="http://schemas.microsoft.com/office/powerpoint/2015/main" val="1"/>
-              </p:ext>
-            </p:extLst>
-          </p:nvPr>
-        </p:nvSpPr>
-        <p:spPr>
-          <a:xfrm>
-            <a:off x="1" y="0"/>
-            <a:ext cx="6090572" cy="6858000"/>
           </a:xfrm>
           <a:prstGeom prst="rect">
             <a:avLst/>
@@ -3805,10 +3544,10 @@
       </p:sp>
       <p:pic>
         <p:nvPicPr>
-          <p:cNvPr id="17" name="Picture 16">
-            <a:extLst>
-              <a:ext uri="{FF2B5EF4-FFF2-40B4-BE49-F238E27FC236}">
-                <a16:creationId xmlns:a16="http://schemas.microsoft.com/office/drawing/2014/main" id="{2897127E-6CEF-446C-BE87-93B7C46E49D1}"/>
+          <p:cNvPr id="26" name="Picture 25">
+            <a:extLst>
+              <a:ext uri="{FF2B5EF4-FFF2-40B4-BE49-F238E27FC236}">
+                <a16:creationId xmlns:a16="http://schemas.microsoft.com/office/drawing/2014/main" id="{2270F1FA-0425-408F-9861-80BF5AFB276D}"/>
               </a:ext>
               <a:ext uri="{C183D7F6-B498-43B3-948B-1728B52AA6E4}">
                 <adec:decorative xmlns:adec="http://schemas.microsoft.com/office/drawing/2017/decorative" val="1"/>
@@ -3850,24 +3589,86 @@
       </p:pic>
       <p:sp>
         <p:nvSpPr>
-          <p:cNvPr id="2" name="Titel 1">
-            <a:extLst>
-              <a:ext uri="{FF2B5EF4-FFF2-40B4-BE49-F238E27FC236}">
-                <a16:creationId xmlns:a16="http://schemas.microsoft.com/office/drawing/2014/main" id="{ACA01065-2322-4731-AC5A-D1F52FC338C4}"/>
-              </a:ext>
-            </a:extLst>
-          </p:cNvPr>
-          <p:cNvSpPr>
-            <a:spLocks noGrp="1"/>
-          </p:cNvSpPr>
-          <p:nvPr>
-            <p:ph type="title"/>
+          <p:cNvPr id="3" name="Untertitel 2">
+            <a:extLst>
+              <a:ext uri="{FF2B5EF4-FFF2-40B4-BE49-F238E27FC236}">
+                <a16:creationId xmlns:a16="http://schemas.microsoft.com/office/drawing/2014/main" id="{501893E9-0561-4A96-9DAF-014628E62172}"/>
+              </a:ext>
+            </a:extLst>
+          </p:cNvPr>
+          <p:cNvSpPr>
+            <a:spLocks noGrp="1"/>
+          </p:cNvSpPr>
+          <p:nvPr>
+            <p:ph type="subTitle" idx="1"/>
           </p:nvPr>
         </p:nvSpPr>
         <p:spPr>
           <a:xfrm>
-            <a:off x="640079" y="2053641"/>
-            <a:ext cx="3669161" cy="2760098"/>
+            <a:off x="3045368" y="4074718"/>
+            <a:ext cx="6105194" cy="682079"/>
+          </a:xfrm>
+        </p:spPr>
+        <p:txBody>
+          <a:bodyPr>
+            <a:normAutofit fontScale="85000" lnSpcReduction="20000"/>
+          </a:bodyPr>
+          <a:lstStyle/>
+          <a:p>
+            <a:r>
+              <a:rPr lang="en-GB" dirty="0">
+                <a:solidFill>
+                  <a:srgbClr val="FFFFFF"/>
+                </a:solidFill>
+              </a:rPr>
+              <a:t>Maurizio </a:t>
+            </a:r>
+            <a:r>
+              <a:rPr lang="en-GB" dirty="0" err="1">
+                <a:solidFill>
+                  <a:srgbClr val="FFFFFF"/>
+                </a:solidFill>
+              </a:rPr>
+              <a:t>Pasquinelli</a:t>
+            </a:r>
+            <a:endParaRPr lang="en-GB" dirty="0">
+              <a:solidFill>
+                <a:srgbClr val="FFFFFF"/>
+              </a:solidFill>
+            </a:endParaRPr>
+          </a:p>
+          <a:p>
+            <a:r>
+              <a:rPr lang="en-GB" dirty="0">
+                <a:solidFill>
+                  <a:srgbClr val="FFFFFF"/>
+                </a:solidFill>
+              </a:rPr>
+              <a:t>Salome Müller</a:t>
+            </a:r>
+          </a:p>
+        </p:txBody>
+      </p:sp>
+      <p:sp>
+        <p:nvSpPr>
+          <p:cNvPr id="2" name="Titel 1">
+            <a:extLst>
+              <a:ext uri="{FF2B5EF4-FFF2-40B4-BE49-F238E27FC236}">
+                <a16:creationId xmlns:a16="http://schemas.microsoft.com/office/drawing/2014/main" id="{43792654-E2A4-4215-BF89-6A10B27420D4}"/>
+              </a:ext>
+            </a:extLst>
+          </p:cNvPr>
+          <p:cNvSpPr>
+            <a:spLocks noGrp="1"/>
+          </p:cNvSpPr>
+          <p:nvPr>
+            <p:ph type="ctrTitle"/>
+          </p:nvPr>
+        </p:nvSpPr>
+        <p:spPr>
+          <a:xfrm>
+            <a:off x="3045368" y="2043663"/>
+            <a:ext cx="6105194" cy="2031055"/>
           </a:xfrm>
         </p:spPr>
         <p:txBody>
@@ -3882,31 +3683,347 @@
                   <a:srgbClr val="FFFFFF"/>
                 </a:solidFill>
               </a:rPr>
-              <a:t>What is LEDtrix?</a:t>
-            </a:r>
-          </a:p>
-        </p:txBody>
-      </p:sp>
-      <p:sp>
-        <p:nvSpPr>
-          <p:cNvPr id="3" name="Inhaltsplatzhalter 2">
-            <a:extLst>
-              <a:ext uri="{FF2B5EF4-FFF2-40B4-BE49-F238E27FC236}">
-                <a16:creationId xmlns:a16="http://schemas.microsoft.com/office/drawing/2014/main" id="{FAC27CFD-75A2-4A2C-ACC8-9DCDB00D3FC6}"/>
-              </a:ext>
-            </a:extLst>
-          </p:cNvPr>
-          <p:cNvSpPr>
-            <a:spLocks noGrp="1"/>
-          </p:cNvSpPr>
-          <p:nvPr>
-            <p:ph idx="1"/>
-          </p:nvPr>
-        </p:nvSpPr>
+              <a:t>LEDtrix </a:t>
+            </a:r>
+          </a:p>
+        </p:txBody>
+      </p:sp>
+    </p:spTree>
+    <p:extLst>
+      <p:ext uri="{BB962C8B-B14F-4D97-AF65-F5344CB8AC3E}">
+        <p14:creationId xmlns:p14="http://schemas.microsoft.com/office/powerpoint/2010/main" val="170765115"/>
+      </p:ext>
+    </p:extLst>
+  </p:cSld>
+  <p:clrMapOvr>
+    <a:masterClrMapping/>
+  </p:clrMapOvr>
+  <mc:AlternateContent xmlns:mc="http://schemas.openxmlformats.org/markup-compatibility/2006" xmlns:p14="http://schemas.microsoft.com/office/powerpoint/2010/main">
+    <mc:Choice Requires="p14">
+      <p:transition spd="slow" p14:dur="2000" advTm="12773"/>
+    </mc:Choice>
+    <mc:Fallback xmlns="">
+      <p:transition spd="slow" advTm="12773"/>
+    </mc:Fallback>
+  </mc:AlternateContent>
+</p:sld>
+</file>
+
+<file path=ppt/slides/slide2.xml><?xml version="1.0" encoding="utf-8"?>
+<p:sld xmlns:a="http://schemas.openxmlformats.org/drawingml/2006/main" xmlns:r="http://schemas.openxmlformats.org/officeDocument/2006/relationships" xmlns:p="http://schemas.openxmlformats.org/presentationml/2006/main">
+  <p:cSld>
+    <p:bg>
+      <p:bgPr>
+        <a:solidFill>
+          <a:schemeClr val="bg1"/>
+        </a:solidFill>
+        <a:effectLst/>
+      </p:bgPr>
+    </p:bg>
+    <p:spTree>
+      <p:nvGrpSpPr>
+        <p:cNvPr id="1" name=""/>
+        <p:cNvGrpSpPr/>
+        <p:nvPr/>
+      </p:nvGrpSpPr>
+      <p:grpSpPr>
+        <a:xfrm>
+          <a:off x="0" y="0"/>
+          <a:ext cx="0" cy="0"/>
+          <a:chOff x="0" y="0"/>
+          <a:chExt cx="0" cy="0"/>
+        </a:xfrm>
+      </p:grpSpPr>
+      <p:pic>
+        <p:nvPicPr>
+          <p:cNvPr id="5" name="Grafik 4" descr="Ein Bild, das Boden, drinnen, rot, sitzend enthält.&#10;&#10;Mit sehr hoher Zuverlässigkeit generierte Beschreibung">
+            <a:extLst>
+              <a:ext uri="{FF2B5EF4-FFF2-40B4-BE49-F238E27FC236}">
+                <a16:creationId xmlns:a16="http://schemas.microsoft.com/office/drawing/2014/main" id="{B4221C6D-CC9C-48BC-865C-051CE87191E2}"/>
+              </a:ext>
+            </a:extLst>
+          </p:cNvPr>
+          <p:cNvPicPr>
+            <a:picLocks noChangeAspect="1"/>
+          </p:cNvPicPr>
+          <p:nvPr/>
+        </p:nvPicPr>
+        <p:blipFill rotWithShape="1">
+          <a:blip r:embed="rId2">
+            <a:extLst>
+              <a:ext uri="{28A0092B-C50C-407E-A947-70E740481C1C}">
+                <a14:useLocalDpi xmlns:a14="http://schemas.microsoft.com/office/drawing/2010/main" val="0"/>
+              </a:ext>
+            </a:extLst>
+          </a:blip>
+          <a:srcRect t="16497" b="8503"/>
+          <a:stretch/>
+        </p:blipFill>
         <p:spPr>
           <a:xfrm>
-            <a:off x="6090574" y="801866"/>
-            <a:ext cx="5306084" cy="5230634"/>
+            <a:off x="0" y="10"/>
+            <a:ext cx="12192000" cy="6857990"/>
+          </a:xfrm>
+          <a:prstGeom prst="rect">
+            <a:avLst/>
+          </a:prstGeom>
+        </p:spPr>
+      </p:pic>
+      <p:sp>
+        <p:nvSpPr>
+          <p:cNvPr id="40" name="Freeform 5">
+            <a:extLst>
+              <a:ext uri="{FF2B5EF4-FFF2-40B4-BE49-F238E27FC236}">
+                <a16:creationId xmlns:a16="http://schemas.microsoft.com/office/drawing/2014/main" id="{3CD9DF72-87A3-404E-A828-84CBF11A8303}"/>
+              </a:ext>
+              <a:ext uri="{C183D7F6-B498-43B3-948B-1728B52AA6E4}">
+                <adec:decorative xmlns:adec="http://schemas.microsoft.com/office/drawing/2017/decorative" val="1"/>
+              </a:ext>
+            </a:extLst>
+          </p:cNvPr>
+          <p:cNvSpPr>
+            <a:spLocks noGrp="1" noRot="1" noChangeAspect="1" noMove="1" noResize="1" noEditPoints="1" noAdjustHandles="1" noChangeArrowheads="1" noChangeShapeType="1" noTextEdit="1"/>
+          </p:cNvSpPr>
+          <p:nvPr>
+            <p:extLst>
+              <p:ext uri="{386F3935-93C4-4BCD-93E2-E3B085C9AB24}">
+                <p16:designElem xmlns:p16="http://schemas.microsoft.com/office/powerpoint/2015/main" val="1"/>
+              </p:ext>
+            </p:extLst>
+          </p:nvPr>
+        </p:nvSpPr>
+        <p:spPr bwMode="grayWhite">
+          <a:xfrm flipH="1">
+            <a:off x="0" y="998175"/>
+            <a:ext cx="6017172" cy="5859825"/>
+          </a:xfrm>
+          <a:custGeom>
+            <a:avLst/>
+            <a:gdLst>
+              <a:gd name="T0" fmla="*/ 1333 w 1333"/>
+              <a:gd name="T1" fmla="*/ 1031 h 1298"/>
+              <a:gd name="T2" fmla="*/ 1333 w 1333"/>
+              <a:gd name="T3" fmla="*/ 380 h 1298"/>
+              <a:gd name="T4" fmla="*/ 706 w 1333"/>
+              <a:gd name="T5" fmla="*/ 0 h 1298"/>
+              <a:gd name="T6" fmla="*/ 0 w 1333"/>
+              <a:gd name="T7" fmla="*/ 706 h 1298"/>
+              <a:gd name="T8" fmla="*/ 323 w 1333"/>
+              <a:gd name="T9" fmla="*/ 1298 h 1298"/>
+              <a:gd name="T10" fmla="*/ 1090 w 1333"/>
+              <a:gd name="T11" fmla="*/ 1298 h 1298"/>
+              <a:gd name="T12" fmla="*/ 1333 w 1333"/>
+              <a:gd name="T13" fmla="*/ 1031 h 1298"/>
+            </a:gdLst>
+            <a:ahLst/>
+            <a:cxnLst>
+              <a:cxn ang="0">
+                <a:pos x="T0" y="T1"/>
+              </a:cxn>
+              <a:cxn ang="0">
+                <a:pos x="T2" y="T3"/>
+              </a:cxn>
+              <a:cxn ang="0">
+                <a:pos x="T4" y="T5"/>
+              </a:cxn>
+              <a:cxn ang="0">
+                <a:pos x="T6" y="T7"/>
+              </a:cxn>
+              <a:cxn ang="0">
+                <a:pos x="T8" y="T9"/>
+              </a:cxn>
+              <a:cxn ang="0">
+                <a:pos x="T10" y="T11"/>
+              </a:cxn>
+              <a:cxn ang="0">
+                <a:pos x="T12" y="T13"/>
+              </a:cxn>
+            </a:cxnLst>
+            <a:rect l="0" t="0" r="r" b="b"/>
+            <a:pathLst>
+              <a:path w="1333" h="1298">
+                <a:moveTo>
+                  <a:pt x="1333" y="1031"/>
+                </a:moveTo>
+                <a:cubicBezTo>
+                  <a:pt x="1333" y="380"/>
+                  <a:pt x="1333" y="380"/>
+                  <a:pt x="1333" y="380"/>
+                </a:cubicBezTo>
+                <a:cubicBezTo>
+                  <a:pt x="1215" y="154"/>
+                  <a:pt x="979" y="0"/>
+                  <a:pt x="706" y="0"/>
+                </a:cubicBezTo>
+                <a:cubicBezTo>
+                  <a:pt x="317" y="0"/>
+                  <a:pt x="0" y="316"/>
+                  <a:pt x="0" y="706"/>
+                </a:cubicBezTo>
+                <a:cubicBezTo>
+                  <a:pt x="0" y="954"/>
+                  <a:pt x="129" y="1172"/>
+                  <a:pt x="323" y="1298"/>
+                </a:cubicBezTo>
+                <a:cubicBezTo>
+                  <a:pt x="1090" y="1298"/>
+                  <a:pt x="1090" y="1298"/>
+                  <a:pt x="1090" y="1298"/>
+                </a:cubicBezTo>
+                <a:cubicBezTo>
+                  <a:pt x="1193" y="1232"/>
+                  <a:pt x="1276" y="1140"/>
+                  <a:pt x="1333" y="1031"/>
+                </a:cubicBezTo>
+                <a:close/>
+              </a:path>
+            </a:pathLst>
+          </a:custGeom>
+          <a:solidFill>
+            <a:schemeClr val="bg1">
+              <a:alpha val="75000"/>
+            </a:schemeClr>
+          </a:solidFill>
+          <a:ln w="50800" cap="sq" cmpd="dbl">
+            <a:noFill/>
+            <a:miter lim="800000"/>
+          </a:ln>
+          <a:effectLst/>
+          <a:extLst/>
+        </p:spPr>
+        <p:txBody>
+          <a:bodyPr vert="horz" lIns="91440" tIns="45720" rIns="91440" bIns="45720" rtlCol="0" anchor="t">
+            <a:normAutofit/>
+          </a:bodyPr>
+          <a:lstStyle/>
+          <a:p>
+            <a:pPr algn="ctr">
+              <a:spcAft>
+                <a:spcPts val="1000"/>
+              </a:spcAft>
+              <a:buClr>
+                <a:schemeClr val="tx1"/>
+              </a:buClr>
+              <a:buSzPct val="100000"/>
+              <a:buFont typeface="Arial"/>
+              <a:buNone/>
+            </a:pPr>
+            <a:endParaRPr lang="en-US" sz="1600" cap="all"/>
+          </a:p>
+        </p:txBody>
+      </p:sp>
+      <p:sp>
+        <p:nvSpPr>
+          <p:cNvPr id="2" name="Titel 1">
+            <a:extLst>
+              <a:ext uri="{FF2B5EF4-FFF2-40B4-BE49-F238E27FC236}">
+                <a16:creationId xmlns:a16="http://schemas.microsoft.com/office/drawing/2014/main" id="{ACA01065-2322-4731-AC5A-D1F52FC338C4}"/>
+              </a:ext>
+            </a:extLst>
+          </p:cNvPr>
+          <p:cNvSpPr>
+            <a:spLocks noGrp="1"/>
+          </p:cNvSpPr>
+          <p:nvPr>
+            <p:ph type="title"/>
+          </p:nvPr>
+        </p:nvSpPr>
+        <p:spPr>
+          <a:xfrm>
+            <a:off x="709448" y="1913950"/>
+            <a:ext cx="4204137" cy="1342754"/>
+          </a:xfrm>
+        </p:spPr>
+        <p:txBody>
+          <a:bodyPr>
+            <a:normAutofit/>
+          </a:bodyPr>
+          <a:lstStyle/>
+          <a:p>
+            <a:pPr algn="ctr"/>
+            <a:r>
+              <a:rPr lang="en-GB" sz="3600"/>
+              <a:t>What is LEDtrix?</a:t>
+            </a:r>
+          </a:p>
+        </p:txBody>
+      </p:sp>
+      <p:cxnSp>
+        <p:nvCxnSpPr>
+          <p:cNvPr id="42" name="Straight Connector 41">
+            <a:extLst>
+              <a:ext uri="{FF2B5EF4-FFF2-40B4-BE49-F238E27FC236}">
+                <a16:creationId xmlns:a16="http://schemas.microsoft.com/office/drawing/2014/main" id="{20E3A342-4D61-4E3F-AF90-1AB42AEB96CC}"/>
+              </a:ext>
+              <a:ext uri="{C183D7F6-B498-43B3-948B-1728B52AA6E4}">
+                <adec:decorative xmlns:adec="http://schemas.microsoft.com/office/drawing/2017/decorative" val="1"/>
+              </a:ext>
+            </a:extLst>
+          </p:cNvPr>
+          <p:cNvCxnSpPr>
+            <a:cxnSpLocks noGrp="1" noRot="1" noChangeAspect="1" noMove="1" noResize="1" noEditPoints="1" noAdjustHandles="1" noChangeArrowheads="1" noChangeShapeType="1"/>
+          </p:cNvCxnSpPr>
+          <p:nvPr>
+            <p:extLst>
+              <p:ext uri="{386F3935-93C4-4BCD-93E2-E3B085C9AB24}">
+                <p16:designElem xmlns:p16="http://schemas.microsoft.com/office/powerpoint/2015/main" val="1"/>
+              </p:ext>
+            </p:extLst>
+          </p:nvPr>
+        </p:nvCxnSpPr>
+        <p:spPr>
+          <a:xfrm>
+            <a:off x="2287051" y="3337139"/>
+            <a:ext cx="935420" cy="0"/>
+          </a:xfrm>
+          <a:prstGeom prst="line">
+            <a:avLst/>
+          </a:prstGeom>
+          <a:ln w="25400" cap="sq">
+            <a:solidFill>
+              <a:schemeClr val="tx1">
+                <a:lumMod val="85000"/>
+                <a:lumOff val="15000"/>
+              </a:schemeClr>
+            </a:solidFill>
+            <a:bevel/>
+          </a:ln>
+        </p:spPr>
+        <p:style>
+          <a:lnRef idx="1">
+            <a:schemeClr val="accent1"/>
+          </a:lnRef>
+          <a:fillRef idx="0">
+            <a:schemeClr val="accent1"/>
+          </a:fillRef>
+          <a:effectRef idx="0">
+            <a:schemeClr val="accent1"/>
+          </a:effectRef>
+          <a:fontRef idx="minor">
+            <a:schemeClr val="tx1"/>
+          </a:fontRef>
+        </p:style>
+      </p:cxnSp>
+      <p:sp>
+        <p:nvSpPr>
+          <p:cNvPr id="3" name="Inhaltsplatzhalter 2">
+            <a:extLst>
+              <a:ext uri="{FF2B5EF4-FFF2-40B4-BE49-F238E27FC236}">
+                <a16:creationId xmlns:a16="http://schemas.microsoft.com/office/drawing/2014/main" id="{FAC27CFD-75A2-4A2C-ACC8-9DCDB00D3FC6}"/>
+              </a:ext>
+            </a:extLst>
+          </p:cNvPr>
+          <p:cNvSpPr>
+            <a:spLocks noGrp="1"/>
+          </p:cNvSpPr>
+          <p:nvPr>
+            <p:ph idx="1"/>
+          </p:nvPr>
+        </p:nvSpPr>
+        <p:spPr>
+          <a:xfrm>
+            <a:off x="525516" y="3417573"/>
+            <a:ext cx="4593021" cy="2619839"/>
           </a:xfrm>
         </p:spPr>
         <p:txBody>
@@ -3916,58 +4033,20 @@
           <a:lstStyle/>
           <a:p>
             <a:r>
-              <a:rPr lang="en-GB" sz="2400" dirty="0">
-                <a:solidFill>
-                  <a:srgbClr val="000000"/>
-                </a:solidFill>
-              </a:rPr>
+              <a:rPr lang="en-GB" sz="1800"/>
               <a:t>LED matrix in a box</a:t>
             </a:r>
           </a:p>
           <a:p>
             <a:r>
-              <a:rPr lang="en-GB" sz="2400" dirty="0">
-                <a:solidFill>
-                  <a:srgbClr val="000000"/>
-                </a:solidFill>
-              </a:rPr>
+              <a:rPr lang="en-GB" sz="1800"/>
               <a:t>Controlled by Raspberry Pi</a:t>
             </a:r>
           </a:p>
           <a:p>
             <a:r>
-              <a:rPr lang="en-GB" sz="2400" dirty="0">
-                <a:solidFill>
-                  <a:srgbClr val="000000"/>
-                </a:solidFill>
-              </a:rPr>
-              <a:t>To play Tic Tac Toe, Raindrops and Snake</a:t>
-            </a:r>
-          </a:p>
-          <a:p>
-            <a:r>
-              <a:rPr lang="en-GB" sz="2400" dirty="0">
-                <a:solidFill>
-                  <a:srgbClr val="000000"/>
-                </a:solidFill>
-              </a:rPr>
-              <a:t>PICTURE </a:t>
-            </a:r>
-            <a:r>
-              <a:rPr lang="en-GB" sz="2400" dirty="0" err="1">
-                <a:solidFill>
-                  <a:srgbClr val="000000"/>
-                </a:solidFill>
-              </a:rPr>
-              <a:t>fertigi</a:t>
-            </a:r>
-            <a:r>
-              <a:rPr lang="en-GB" sz="2400" dirty="0">
-                <a:solidFill>
-                  <a:srgbClr val="000000"/>
-                </a:solidFill>
-              </a:rPr>
-              <a:t> box</a:t>
+              <a:rPr lang="en-GB" sz="1800"/>
+              <a:t>Tic Tac Toe, Raindrops and Snake</a:t>
             </a:r>
           </a:p>
         </p:txBody>
@@ -4020,10 +4099,10 @@
       </p:grpSpPr>
       <p:sp>
         <p:nvSpPr>
-          <p:cNvPr id="34" name="Rectangle 33">
-            <a:extLst>
-              <a:ext uri="{FF2B5EF4-FFF2-40B4-BE49-F238E27FC236}">
-                <a16:creationId xmlns:a16="http://schemas.microsoft.com/office/drawing/2014/main" id="{B4F5FA0D-0104-4987-8241-EFF7C85B88DE}"/>
+          <p:cNvPr id="74" name="Rectangle 70">
+            <a:extLst>
+              <a:ext uri="{FF2B5EF4-FFF2-40B4-BE49-F238E27FC236}">
+                <a16:creationId xmlns:a16="http://schemas.microsoft.com/office/drawing/2014/main" id="{99899462-FC16-43B0-966B-FCA263450716}"/>
               </a:ext>
               <a:ext uri="{C183D7F6-B498-43B3-948B-1728B52AA6E4}">
                 <adec:decorative xmlns:adec="http://schemas.microsoft.com/office/drawing/2017/decorative" val="1"/>
@@ -4041,41 +4120,21 @@
             </p:extLst>
           </p:nvPr>
         </p:nvSpPr>
-        <p:spPr>
+        <p:spPr bwMode="ltGray">
           <a:xfrm>
-            <a:off x="1" y="0"/>
-            <a:ext cx="6090572" cy="6858000"/>
+            <a:off x="4654295" y="478232"/>
+            <a:ext cx="7034121" cy="5918673"/>
           </a:xfrm>
           <a:prstGeom prst="rect">
             <a:avLst/>
           </a:prstGeom>
-          <a:gradFill>
-            <a:gsLst>
-              <a:gs pos="0">
-                <a:schemeClr val="accent6">
-                  <a:lumMod val="90000"/>
-                </a:schemeClr>
-              </a:gs>
-              <a:gs pos="25000">
-                <a:schemeClr val="accent6">
-                  <a:lumMod val="90000"/>
-                </a:schemeClr>
-              </a:gs>
-              <a:gs pos="94000">
-                <a:schemeClr val="bg2">
-                  <a:lumMod val="25000"/>
-                </a:schemeClr>
-              </a:gs>
-              <a:gs pos="100000">
-                <a:schemeClr val="bg2">
-                  <a:lumMod val="25000"/>
-                </a:schemeClr>
-              </a:gs>
-            </a:gsLst>
-            <a:lin ang="4200000" scaled="0"/>
-          </a:gradFill>
-          <a:ln>
-            <a:noFill/>
+          <a:solidFill>
+            <a:srgbClr val="404040"/>
+          </a:solidFill>
+          <a:ln w="127000" cap="sq" cmpd="thinThick">
+            <a:solidFill>
+              <a:srgbClr val="404040"/>
+            </a:solidFill>
           </a:ln>
         </p:spPr>
         <p:style>
@@ -4103,28 +4162,58 @@
           </a:p>
         </p:txBody>
       </p:sp>
+      <p:sp>
+        <p:nvSpPr>
+          <p:cNvPr id="2" name="Titel 1">
+            <a:extLst>
+              <a:ext uri="{FF2B5EF4-FFF2-40B4-BE49-F238E27FC236}">
+                <a16:creationId xmlns:a16="http://schemas.microsoft.com/office/drawing/2014/main" id="{9F911658-3497-45FE-B8DE-51AAAA6C7586}"/>
+              </a:ext>
+            </a:extLst>
+          </p:cNvPr>
+          <p:cNvSpPr>
+            <a:spLocks noGrp="1"/>
+          </p:cNvSpPr>
+          <p:nvPr>
+            <p:ph type="title"/>
+          </p:nvPr>
+        </p:nvSpPr>
+        <p:spPr>
+          <a:xfrm>
+            <a:off x="5297762" y="1053711"/>
+            <a:ext cx="5638994" cy="1424446"/>
+          </a:xfrm>
+        </p:spPr>
+        <p:txBody>
+          <a:bodyPr>
+            <a:normAutofit/>
+          </a:bodyPr>
+          <a:lstStyle/>
+          <a:p>
+            <a:r>
+              <a:rPr lang="en-GB">
+                <a:solidFill>
+                  <a:srgbClr val="FFFFFF"/>
+                </a:solidFill>
+              </a:rPr>
+              <a:t>What we used and why</a:t>
+            </a:r>
+          </a:p>
+        </p:txBody>
+      </p:sp>
       <p:pic>
         <p:nvPicPr>
-          <p:cNvPr id="36" name="Picture 35">
-            <a:extLst>
-              <a:ext uri="{FF2B5EF4-FFF2-40B4-BE49-F238E27FC236}">
-                <a16:creationId xmlns:a16="http://schemas.microsoft.com/office/drawing/2014/main" id="{2897127E-6CEF-446C-BE87-93B7C46E49D1}"/>
-              </a:ext>
-              <a:ext uri="{C183D7F6-B498-43B3-948B-1728B52AA6E4}">
-                <adec:decorative xmlns:adec="http://schemas.microsoft.com/office/drawing/2017/decorative" val="1"/>
+          <p:cNvPr id="13" name="Grafik 12">
+            <a:extLst>
+              <a:ext uri="{FF2B5EF4-FFF2-40B4-BE49-F238E27FC236}">
+                <a16:creationId xmlns:a16="http://schemas.microsoft.com/office/drawing/2014/main" id="{1C07BAF9-6605-4423-831E-CE460FF886B8}"/>
               </a:ext>
             </a:extLst>
           </p:cNvPr>
           <p:cNvPicPr>
-            <a:picLocks noGrp="1" noRot="1" noChangeAspect="1" noMove="1" noResize="1" noEditPoints="1" noAdjustHandles="1" noChangeArrowheads="1" noChangeShapeType="1" noCrop="1"/>
+            <a:picLocks noChangeAspect="1"/>
           </p:cNvPicPr>
-          <p:nvPr>
-            <p:extLst>
-              <p:ext uri="{386F3935-93C4-4BCD-93E2-E3B085C9AB24}">
-                <p16:designElem xmlns:p16="http://schemas.microsoft.com/office/powerpoint/2015/main" val="1"/>
-              </p:ext>
-            </p:extLst>
-          </p:nvPr>
+          <p:nvPr/>
         </p:nvPicPr>
         <p:blipFill>
           <a:blip r:embed="rId2">
@@ -4140,153 +4229,170 @@
         </p:blipFill>
         <p:spPr>
           <a:xfrm>
-            <a:off x="0" y="0"/>
-            <a:ext cx="12192000" cy="6858000"/>
+            <a:off x="918300" y="478232"/>
+            <a:ext cx="2789902" cy="2789902"/>
           </a:xfrm>
           <a:prstGeom prst="rect">
             <a:avLst/>
           </a:prstGeom>
         </p:spPr>
       </p:pic>
-      <p:sp>
-        <p:nvSpPr>
-          <p:cNvPr id="2" name="Titel 1">
-            <a:extLst>
-              <a:ext uri="{FF2B5EF4-FFF2-40B4-BE49-F238E27FC236}">
-                <a16:creationId xmlns:a16="http://schemas.microsoft.com/office/drawing/2014/main" id="{9F911658-3497-45FE-B8DE-51AAAA6C7586}"/>
-              </a:ext>
-            </a:extLst>
-          </p:cNvPr>
-          <p:cNvSpPr>
-            <a:spLocks noGrp="1"/>
-          </p:cNvSpPr>
-          <p:nvPr>
-            <p:ph type="title"/>
-          </p:nvPr>
-        </p:nvSpPr>
+      <p:cxnSp>
+        <p:nvCxnSpPr>
+          <p:cNvPr id="73" name="Straight Connector 72">
+            <a:extLst>
+              <a:ext uri="{FF2B5EF4-FFF2-40B4-BE49-F238E27FC236}">
+                <a16:creationId xmlns:a16="http://schemas.microsoft.com/office/drawing/2014/main" id="{AAFEA932-2DF1-410C-A00A-7A1E7DBF7511}"/>
+              </a:ext>
+              <a:ext uri="{C183D7F6-B498-43B3-948B-1728B52AA6E4}">
+                <adec:decorative xmlns:adec="http://schemas.microsoft.com/office/drawing/2017/decorative" val="1"/>
+              </a:ext>
+            </a:extLst>
+          </p:cNvPr>
+          <p:cNvCxnSpPr>
+            <a:cxnSpLocks noGrp="1" noRot="1" noChangeAspect="1" noMove="1" noResize="1" noEditPoints="1" noAdjustHandles="1" noChangeArrowheads="1" noChangeShapeType="1"/>
+          </p:cNvCxnSpPr>
+          <p:nvPr>
+            <p:extLst>
+              <p:ext uri="{386F3935-93C4-4BCD-93E2-E3B085C9AB24}">
+                <p16:designElem xmlns:p16="http://schemas.microsoft.com/office/powerpoint/2015/main" val="1"/>
+              </p:ext>
+            </p:extLst>
+          </p:nvPr>
+        </p:nvCxnSpPr>
         <p:spPr>
           <a:xfrm>
-            <a:off x="640079" y="2053641"/>
-            <a:ext cx="3669161" cy="2760098"/>
+            <a:off x="5430098" y="2639023"/>
+            <a:ext cx="4562441" cy="0"/>
+          </a:xfrm>
+          <a:prstGeom prst="line">
+            <a:avLst/>
+          </a:prstGeom>
+          <a:ln w="22225">
+            <a:solidFill>
+              <a:srgbClr val="E7E6E6"/>
+            </a:solidFill>
+          </a:ln>
+        </p:spPr>
+        <p:style>
+          <a:lnRef idx="1">
+            <a:schemeClr val="accent1"/>
+          </a:lnRef>
+          <a:fillRef idx="0">
+            <a:schemeClr val="accent1"/>
+          </a:fillRef>
+          <a:effectRef idx="0">
+            <a:schemeClr val="accent1"/>
+          </a:effectRef>
+          <a:fontRef idx="minor">
+            <a:schemeClr val="tx1"/>
+          </a:fontRef>
+        </p:style>
+      </p:cxnSp>
+      <p:pic>
+        <p:nvPicPr>
+          <p:cNvPr id="28" name="Grafik 27" descr="Ein Bild, das Wand, drinnen enthält.&#10;&#10;Mit sehr hoher Zuverlässigkeit generierte Beschreibung">
+            <a:extLst>
+              <a:ext uri="{FF2B5EF4-FFF2-40B4-BE49-F238E27FC236}">
+                <a16:creationId xmlns:a16="http://schemas.microsoft.com/office/drawing/2014/main" id="{7ED1A68E-AD7F-4E91-BB75-4EFF75D642E4}"/>
+              </a:ext>
+            </a:extLst>
+          </p:cNvPr>
+          <p:cNvPicPr>
+            <a:picLocks noChangeAspect="1"/>
+          </p:cNvPicPr>
+          <p:nvPr/>
+        </p:nvPicPr>
+        <p:blipFill>
+          <a:blip r:embed="rId3">
+            <a:extLst>
+              <a:ext uri="{28A0092B-C50C-407E-A947-70E740481C1C}">
+                <a14:useLocalDpi xmlns:a14="http://schemas.microsoft.com/office/drawing/2010/main" val="0"/>
+              </a:ext>
+            </a:extLst>
+          </a:blip>
+          <a:stretch>
+            <a:fillRect/>
+          </a:stretch>
+        </p:blipFill>
+        <p:spPr>
+          <a:xfrm>
+            <a:off x="481886" y="3610803"/>
+            <a:ext cx="3662730" cy="2747047"/>
+          </a:xfrm>
+          <a:prstGeom prst="rect">
+            <a:avLst/>
+          </a:prstGeom>
+        </p:spPr>
+      </p:pic>
+      <p:sp>
+        <p:nvSpPr>
+          <p:cNvPr id="10" name="Content Placeholder 9">
+            <a:extLst>
+              <a:ext uri="{FF2B5EF4-FFF2-40B4-BE49-F238E27FC236}">
+                <a16:creationId xmlns:a16="http://schemas.microsoft.com/office/drawing/2014/main" id="{2CB2D89F-CCCF-4F2B-9968-21C18C3406DE}"/>
+              </a:ext>
+            </a:extLst>
+          </p:cNvPr>
+          <p:cNvSpPr>
+            <a:spLocks noGrp="1"/>
+          </p:cNvSpPr>
+          <p:nvPr>
+            <p:ph idx="1"/>
+          </p:nvPr>
+        </p:nvSpPr>
+        <p:spPr>
+          <a:xfrm>
+            <a:off x="5297762" y="2799889"/>
+            <a:ext cx="5747187" cy="2987543"/>
           </a:xfrm>
         </p:spPr>
         <p:txBody>
-          <a:bodyPr>
+          <a:bodyPr anchor="t">
             <a:normAutofit/>
           </a:bodyPr>
           <a:lstStyle/>
           <a:p>
-            <a:r>
-              <a:rPr lang="en-GB" dirty="0">
+            <a:endParaRPr lang="en-US" sz="2400">
+              <a:solidFill>
+                <a:srgbClr val="FFFFFF"/>
+              </a:solidFill>
+            </a:endParaRPr>
+          </a:p>
+          <a:p>
+            <a:r>
+              <a:rPr lang="en-US" sz="2400">
                 <a:solidFill>
                   <a:srgbClr val="FFFFFF"/>
                 </a:solidFill>
               </a:rPr>
-              <a:t>What we used and why</a:t>
-            </a:r>
-          </a:p>
-        </p:txBody>
-      </p:sp>
-      <p:sp>
-        <p:nvSpPr>
-          <p:cNvPr id="10" name="Content Placeholder 9">
-            <a:extLst>
-              <a:ext uri="{FF2B5EF4-FFF2-40B4-BE49-F238E27FC236}">
-                <a16:creationId xmlns:a16="http://schemas.microsoft.com/office/drawing/2014/main" id="{2CB2D89F-CCCF-4F2B-9968-21C18C3406DE}"/>
-              </a:ext>
-            </a:extLst>
-          </p:cNvPr>
-          <p:cNvSpPr>
-            <a:spLocks noGrp="1"/>
-          </p:cNvSpPr>
-          <p:nvPr>
-            <p:ph idx="1"/>
-          </p:nvPr>
-        </p:nvSpPr>
-        <p:spPr>
-          <a:xfrm>
-            <a:off x="6090574" y="801866"/>
-            <a:ext cx="5306084" cy="5230634"/>
-          </a:xfrm>
-        </p:spPr>
-        <p:txBody>
-          <a:bodyPr anchor="ctr">
-            <a:normAutofit/>
-          </a:bodyPr>
-          <a:lstStyle/>
-          <a:p>
-            <a:endParaRPr lang="en-US" sz="2400" dirty="0">
-              <a:solidFill>
-                <a:srgbClr val="000000"/>
-              </a:solidFill>
-            </a:endParaRPr>
-          </a:p>
-          <a:p>
-            <a:r>
-              <a:rPr lang="en-US" sz="2400" dirty="0">
+              <a:t>APA -102 LED-strip (PICTURE ufgrollt)</a:t>
+            </a:r>
+          </a:p>
+          <a:p>
+            <a:r>
+              <a:rPr lang="en-US" sz="2400">
                 <a:solidFill>
-                  <a:srgbClr val="000000"/>
+                  <a:srgbClr val="FFFFFF"/>
                 </a:solidFill>
               </a:rPr>
-              <a:t>APA -102 LED-strip (PICTURE </a:t>
-            </a:r>
-            <a:r>
-              <a:rPr lang="en-US" sz="2400" dirty="0" err="1">
+              <a:t>Squid-Buttons (PICTURE knöpf)</a:t>
+            </a:r>
+          </a:p>
+          <a:p>
+            <a:r>
+              <a:rPr lang="en-US" sz="2400">
                 <a:solidFill>
-                  <a:srgbClr val="000000"/>
-                </a:solidFill>
-              </a:rPr>
-              <a:t>ufgrollt</a:t>
-            </a:r>
-            <a:r>
-              <a:rPr lang="en-US" sz="2400" dirty="0">
-                <a:solidFill>
-                  <a:srgbClr val="000000"/>
-                </a:solidFill>
-              </a:rPr>
-              <a:t>)</a:t>
-            </a:r>
-          </a:p>
-          <a:p>
-            <a:r>
-              <a:rPr lang="en-US" sz="2400" dirty="0">
-                <a:solidFill>
-                  <a:srgbClr val="000000"/>
-                </a:solidFill>
-              </a:rPr>
-              <a:t>Squid-Buttons (PICTURE </a:t>
-            </a:r>
-            <a:r>
-              <a:rPr lang="en-US" sz="2400" dirty="0" err="1">
-                <a:solidFill>
-                  <a:srgbClr val="000000"/>
-                </a:solidFill>
-              </a:rPr>
-              <a:t>knöpf</a:t>
-            </a:r>
-            <a:r>
-              <a:rPr lang="en-US" sz="2400" dirty="0">
-                <a:solidFill>
-                  <a:srgbClr val="000000"/>
-                </a:solidFill>
-              </a:rPr>
-              <a:t>)</a:t>
-            </a:r>
-          </a:p>
-          <a:p>
-            <a:r>
-              <a:rPr lang="en-US" sz="2400" dirty="0">
-                <a:solidFill>
-                  <a:srgbClr val="000000"/>
+                  <a:srgbClr val="FFFFFF"/>
                 </a:solidFill>
               </a:rPr>
               <a:t>Acrylic glass</a:t>
             </a:r>
           </a:p>
           <a:p>
-            <a:endParaRPr lang="en-US" sz="2400" dirty="0">
+            <a:endParaRPr lang="en-US" sz="2400">
               <a:solidFill>
-                <a:srgbClr val="000000"/>
+                <a:srgbClr val="FFFFFF"/>
               </a:solidFill>
             </a:endParaRPr>
           </a:p>
@@ -4338,12 +4444,47 @@
           <a:chExt cx="0" cy="0"/>
         </a:xfrm>
       </p:grpSpPr>
+      <p:sp>
+        <p:nvSpPr>
+          <p:cNvPr id="2" name="Titel 1">
+            <a:extLst>
+              <a:ext uri="{FF2B5EF4-FFF2-40B4-BE49-F238E27FC236}">
+                <a16:creationId xmlns:a16="http://schemas.microsoft.com/office/drawing/2014/main" id="{9F911658-3497-45FE-B8DE-51AAAA6C7586}"/>
+              </a:ext>
+            </a:extLst>
+          </p:cNvPr>
+          <p:cNvSpPr>
+            <a:spLocks noGrp="1"/>
+          </p:cNvSpPr>
+          <p:nvPr>
+            <p:ph type="title"/>
+          </p:nvPr>
+        </p:nvSpPr>
+        <p:spPr>
+          <a:xfrm>
+            <a:off x="2257214" y="2694018"/>
+            <a:ext cx="5406902" cy="1469965"/>
+          </a:xfrm>
+        </p:spPr>
+        <p:txBody>
+          <a:bodyPr anchor="ctr">
+            <a:normAutofit/>
+          </a:bodyPr>
+          <a:lstStyle/>
+          <a:p>
+            <a:r>
+              <a:rPr lang="en-GB"/>
+              <a:t>Budget</a:t>
+            </a:r>
+          </a:p>
+        </p:txBody>
+      </p:sp>
       <p:pic>
         <p:nvPicPr>
-          <p:cNvPr id="6" name="Grafik 5" descr="Ein Bild, das Boden, Person, Straße, draußen enthält.&#10;&#10;Mit sehr hoher Zuverlässigkeit generierte Beschreibung">
-            <a:extLst>
-              <a:ext uri="{FF2B5EF4-FFF2-40B4-BE49-F238E27FC236}">
-                <a16:creationId xmlns:a16="http://schemas.microsoft.com/office/drawing/2014/main" id="{3D162D89-B966-4A65-B48E-E0EC307D5E40}"/>
+          <p:cNvPr id="83" name="Graphic 82">
+            <a:extLst>
+              <a:ext uri="{FF2B5EF4-FFF2-40B4-BE49-F238E27FC236}">
+                <a16:creationId xmlns:a16="http://schemas.microsoft.com/office/drawing/2014/main" id="{C7B4D6E4-60FF-4116-BD10-9B340262DF58}"/>
               </a:ext>
             </a:extLst>
           </p:cNvPr>
@@ -4352,268 +4493,14 @@
           </p:cNvPicPr>
           <p:nvPr/>
         </p:nvPicPr>
-        <p:blipFill rotWithShape="1">
+        <p:blipFill>
           <a:blip r:embed="rId2">
-            <a:alphaModFix/>
             <a:extLst>
               <a:ext uri="{28A0092B-C50C-407E-A947-70E740481C1C}">
                 <a14:useLocalDpi xmlns:a14="http://schemas.microsoft.com/office/drawing/2010/main" val="0"/>
               </a:ext>
-            </a:extLst>
-          </a:blip>
-          <a:srcRect l="1480" r="5" b="5"/>
-          <a:stretch/>
-        </p:blipFill>
-        <p:spPr>
-          <a:xfrm>
-            <a:off x="8007861" y="1"/>
-            <a:ext cx="4184139" cy="4247004"/>
-          </a:xfrm>
-          <a:custGeom>
-            <a:avLst/>
-            <a:gdLst>
-              <a:gd name="connsiteX0" fmla="*/ 807468 w 4184139"/>
-              <a:gd name="connsiteY0" fmla="*/ 0 h 4247004"/>
-              <a:gd name="connsiteX1" fmla="*/ 4068803 w 4184139"/>
-              <a:gd name="connsiteY1" fmla="*/ 0 h 4247004"/>
-              <a:gd name="connsiteX2" fmla="*/ 4162158 w 4184139"/>
-              <a:gd name="connsiteY2" fmla="*/ 84846 h 4247004"/>
-              <a:gd name="connsiteX3" fmla="*/ 4184139 w 4184139"/>
-              <a:gd name="connsiteY3" fmla="*/ 109032 h 4247004"/>
-              <a:gd name="connsiteX4" fmla="*/ 4184139 w 4184139"/>
-              <a:gd name="connsiteY4" fmla="*/ 3508705 h 4247004"/>
-              <a:gd name="connsiteX5" fmla="*/ 4162158 w 4184139"/>
-              <a:gd name="connsiteY5" fmla="*/ 3532891 h 4247004"/>
-              <a:gd name="connsiteX6" fmla="*/ 2438135 w 4184139"/>
-              <a:gd name="connsiteY6" fmla="*/ 4247004 h 4247004"/>
-              <a:gd name="connsiteX7" fmla="*/ 0 w 4184139"/>
-              <a:gd name="connsiteY7" fmla="*/ 1808869 h 4247004"/>
-              <a:gd name="connsiteX8" fmla="*/ 714113 w 4184139"/>
-              <a:gd name="connsiteY8" fmla="*/ 84846 h 4247004"/>
-            </a:gdLst>
-            <a:ahLst/>
-            <a:cxnLst>
-              <a:cxn ang="0">
-                <a:pos x="connsiteX0" y="connsiteY0"/>
-              </a:cxn>
-              <a:cxn ang="0">
-                <a:pos x="connsiteX1" y="connsiteY1"/>
-              </a:cxn>
-              <a:cxn ang="0">
-                <a:pos x="connsiteX2" y="connsiteY2"/>
-              </a:cxn>
-              <a:cxn ang="0">
-                <a:pos x="connsiteX3" y="connsiteY3"/>
-              </a:cxn>
-              <a:cxn ang="0">
-                <a:pos x="connsiteX4" y="connsiteY4"/>
-              </a:cxn>
-              <a:cxn ang="0">
-                <a:pos x="connsiteX5" y="connsiteY5"/>
-              </a:cxn>
-              <a:cxn ang="0">
-                <a:pos x="connsiteX6" y="connsiteY6"/>
-              </a:cxn>
-              <a:cxn ang="0">
-                <a:pos x="connsiteX7" y="connsiteY7"/>
-              </a:cxn>
-              <a:cxn ang="0">
-                <a:pos x="connsiteX8" y="connsiteY8"/>
-              </a:cxn>
-            </a:cxnLst>
-            <a:rect l="l" t="t" r="r" b="b"/>
-            <a:pathLst>
-              <a:path w="4184139" h="4247004">
-                <a:moveTo>
-                  <a:pt x="807468" y="0"/>
-                </a:moveTo>
-                <a:lnTo>
-                  <a:pt x="4068803" y="0"/>
-                </a:lnTo>
-                <a:lnTo>
-                  <a:pt x="4162158" y="84846"/>
-                </a:lnTo>
-                <a:lnTo>
-                  <a:pt x="4184139" y="109032"/>
-                </a:lnTo>
-                <a:lnTo>
-                  <a:pt x="4184139" y="3508705"/>
-                </a:lnTo>
-                <a:lnTo>
-                  <a:pt x="4162158" y="3532891"/>
-                </a:lnTo>
-                <a:cubicBezTo>
-                  <a:pt x="3720942" y="3974107"/>
-                  <a:pt x="3111408" y="4247004"/>
-                  <a:pt x="2438135" y="4247004"/>
-                </a:cubicBezTo>
-                <a:cubicBezTo>
-                  <a:pt x="1091590" y="4247004"/>
-                  <a:pt x="0" y="3155414"/>
-                  <a:pt x="0" y="1808869"/>
-                </a:cubicBezTo>
-                <a:cubicBezTo>
-                  <a:pt x="0" y="1135596"/>
-                  <a:pt x="272898" y="526062"/>
-                  <a:pt x="714113" y="84846"/>
-                </a:cubicBezTo>
-                <a:close/>
-              </a:path>
-            </a:pathLst>
-          </a:custGeom>
-          <a:effectLst>
-            <a:softEdge rad="0"/>
-          </a:effectLst>
-        </p:spPr>
-      </p:pic>
-      <p:pic>
-        <p:nvPicPr>
-          <p:cNvPr id="8" name="Grafik 7">
-            <a:extLst>
-              <a:ext uri="{FF2B5EF4-FFF2-40B4-BE49-F238E27FC236}">
-                <a16:creationId xmlns:a16="http://schemas.microsoft.com/office/drawing/2014/main" id="{6A8346AC-DEF1-484F-96A1-C44A159710E0}"/>
-              </a:ext>
-            </a:extLst>
-          </p:cNvPr>
-          <p:cNvPicPr>
-            <a:picLocks noChangeAspect="1"/>
-          </p:cNvPicPr>
-          <p:nvPr/>
-        </p:nvPicPr>
-        <p:blipFill rotWithShape="1">
-          <a:blip r:embed="rId3">
-            <a:alphaModFix/>
-            <a:extLst>
-              <a:ext uri="{28A0092B-C50C-407E-A947-70E740481C1C}">
-                <a14:useLocalDpi xmlns:a14="http://schemas.microsoft.com/office/drawing/2010/main" val="0"/>
-              </a:ext>
-            </a:extLst>
-          </a:blip>
-          <a:srcRect l="6141"/>
-          <a:stretch/>
-        </p:blipFill>
-        <p:spPr>
-          <a:xfrm>
-            <a:off x="1" y="1337091"/>
-            <a:ext cx="5190767" cy="5530385"/>
-          </a:xfrm>
-          <a:custGeom>
-            <a:avLst/>
-            <a:gdLst>
-              <a:gd name="connsiteX0" fmla="*/ 1986067 w 5190767"/>
-              <a:gd name="connsiteY0" fmla="*/ 0 h 5530385"/>
-              <a:gd name="connsiteX1" fmla="*/ 5190767 w 5190767"/>
-              <a:gd name="connsiteY1" fmla="*/ 3204701 h 5530385"/>
-              <a:gd name="connsiteX2" fmla="*/ 4252132 w 5190767"/>
-              <a:gd name="connsiteY2" fmla="*/ 5470767 h 5530385"/>
-              <a:gd name="connsiteX3" fmla="*/ 4186536 w 5190767"/>
-              <a:gd name="connsiteY3" fmla="*/ 5530385 h 5530385"/>
-              <a:gd name="connsiteX4" fmla="*/ 0 w 5190767"/>
-              <a:gd name="connsiteY4" fmla="*/ 5530385 h 5530385"/>
-              <a:gd name="connsiteX5" fmla="*/ 0 w 5190767"/>
-              <a:gd name="connsiteY5" fmla="*/ 692598 h 5530385"/>
-              <a:gd name="connsiteX6" fmla="*/ 194287 w 5190767"/>
-              <a:gd name="connsiteY6" fmla="*/ 547313 h 5530385"/>
-              <a:gd name="connsiteX7" fmla="*/ 1986067 w 5190767"/>
-              <a:gd name="connsiteY7" fmla="*/ 0 h 5530385"/>
-            </a:gdLst>
-            <a:ahLst/>
-            <a:cxnLst>
-              <a:cxn ang="0">
-                <a:pos x="connsiteX0" y="connsiteY0"/>
-              </a:cxn>
-              <a:cxn ang="0">
-                <a:pos x="connsiteX1" y="connsiteY1"/>
-              </a:cxn>
-              <a:cxn ang="0">
-                <a:pos x="connsiteX2" y="connsiteY2"/>
-              </a:cxn>
-              <a:cxn ang="0">
-                <a:pos x="connsiteX3" y="connsiteY3"/>
-              </a:cxn>
-              <a:cxn ang="0">
-                <a:pos x="connsiteX4" y="connsiteY4"/>
-              </a:cxn>
-              <a:cxn ang="0">
-                <a:pos x="connsiteX5" y="connsiteY5"/>
-              </a:cxn>
-              <a:cxn ang="0">
-                <a:pos x="connsiteX6" y="connsiteY6"/>
-              </a:cxn>
-              <a:cxn ang="0">
-                <a:pos x="connsiteX7" y="connsiteY7"/>
-              </a:cxn>
-            </a:cxnLst>
-            <a:rect l="l" t="t" r="r" b="b"/>
-            <a:pathLst>
-              <a:path w="5190767" h="5530385">
-                <a:moveTo>
-                  <a:pt x="1986067" y="0"/>
-                </a:moveTo>
-                <a:cubicBezTo>
-                  <a:pt x="3755974" y="0"/>
-                  <a:pt x="5190767" y="1434794"/>
-                  <a:pt x="5190767" y="3204701"/>
-                </a:cubicBezTo>
-                <a:cubicBezTo>
-                  <a:pt x="5190767" y="4089655"/>
-                  <a:pt x="4832069" y="4890830"/>
-                  <a:pt x="4252132" y="5470767"/>
-                </a:cubicBezTo>
-                <a:lnTo>
-                  <a:pt x="4186536" y="5530385"/>
-                </a:lnTo>
-                <a:lnTo>
-                  <a:pt x="0" y="5530385"/>
-                </a:lnTo>
-                <a:lnTo>
-                  <a:pt x="0" y="692598"/>
-                </a:lnTo>
-                <a:lnTo>
-                  <a:pt x="194287" y="547313"/>
-                </a:lnTo>
-                <a:cubicBezTo>
-                  <a:pt x="705761" y="201768"/>
-                  <a:pt x="1322351" y="0"/>
-                  <a:pt x="1986067" y="0"/>
-                </a:cubicBezTo>
-                <a:close/>
-              </a:path>
-            </a:pathLst>
-          </a:custGeom>
-          <a:effectLst>
-            <a:softEdge rad="0"/>
-          </a:effectLst>
-        </p:spPr>
-      </p:pic>
-      <p:pic>
-        <p:nvPicPr>
-          <p:cNvPr id="50" name="Picture 49">
-            <a:extLst>
-              <a:ext uri="{FF2B5EF4-FFF2-40B4-BE49-F238E27FC236}">
-                <a16:creationId xmlns:a16="http://schemas.microsoft.com/office/drawing/2014/main" id="{4603FC70-67D9-49EF-983C-3853BF2B493D}"/>
-              </a:ext>
-              <a:ext uri="{C183D7F6-B498-43B3-948B-1728B52AA6E4}">
-                <adec:decorative xmlns:adec="http://schemas.microsoft.com/office/drawing/2017/decorative" val="1"/>
-              </a:ext>
-            </a:extLst>
-          </p:cNvPr>
-          <p:cNvPicPr>
-            <a:picLocks noGrp="1" noRot="1" noChangeAspect="1" noMove="1" noResize="1" noEditPoints="1" noAdjustHandles="1" noChangeArrowheads="1" noChangeShapeType="1" noCrop="1"/>
-          </p:cNvPicPr>
-          <p:nvPr>
-            <p:extLst>
-              <p:ext uri="{386F3935-93C4-4BCD-93E2-E3B085C9AB24}">
-                <p16:designElem xmlns:p16="http://schemas.microsoft.com/office/powerpoint/2015/main" val="1"/>
-              </p:ext>
-            </p:extLst>
-          </p:nvPr>
-        </p:nvPicPr>
-        <p:blipFill>
-          <a:blip r:embed="rId4">
-            <a:extLst>
-              <a:ext uri="{28A0092B-C50C-407E-A947-70E740481C1C}">
-                <a14:useLocalDpi xmlns:a14="http://schemas.microsoft.com/office/drawing/2010/main" val="0"/>
+              <a:ext uri="{96DAC541-7B7A-43D3-8B79-37D633B846F1}">
+                <asvg:svgBlip xmlns:asvg="http://schemas.microsoft.com/office/drawing/2016/SVG/main" r:embed="rId3"/>
               </a:ext>
             </a:extLst>
           </a:blip>
@@ -4623,177 +4510,120 @@
         </p:blipFill>
         <p:spPr>
           <a:xfrm>
-            <a:off x="0" y="0"/>
-            <a:ext cx="12192000" cy="6858000"/>
+            <a:off x="838200" y="2880360"/>
+            <a:ext cx="1097280" cy="1097280"/>
           </a:xfrm>
           <a:prstGeom prst="rect">
             <a:avLst/>
           </a:prstGeom>
         </p:spPr>
       </p:pic>
+      <p:sp>
+        <p:nvSpPr>
+          <p:cNvPr id="52" name="Content Placeholder 9">
+            <a:extLst>
+              <a:ext uri="{FF2B5EF4-FFF2-40B4-BE49-F238E27FC236}">
+                <a16:creationId xmlns:a16="http://schemas.microsoft.com/office/drawing/2014/main" id="{2CB2D89F-CCCF-4F2B-9968-21C18C3406DE}"/>
+              </a:ext>
+            </a:extLst>
+          </p:cNvPr>
+          <p:cNvSpPr>
+            <a:spLocks noGrp="1"/>
+          </p:cNvSpPr>
+          <p:nvPr>
+            <p:ph idx="1"/>
+          </p:nvPr>
+        </p:nvSpPr>
+        <p:spPr>
+          <a:xfrm>
+            <a:off x="2257215" y="4352917"/>
+            <a:ext cx="5406902" cy="1688746"/>
+          </a:xfrm>
+        </p:spPr>
+        <p:txBody>
+          <a:bodyPr>
+            <a:normAutofit/>
+          </a:bodyPr>
+          <a:lstStyle/>
+          <a:p>
+            <a:r>
+              <a:rPr lang="en-US" sz="2000"/>
+              <a:t>Too long strip</a:t>
+            </a:r>
+          </a:p>
+          <a:p>
+            <a:r>
+              <a:rPr lang="en-US" sz="2000"/>
+              <a:t>Not enough power</a:t>
+            </a:r>
+          </a:p>
+          <a:p>
+            <a:r>
+              <a:rPr lang="en-US" sz="2000"/>
+              <a:t>Flickering</a:t>
+            </a:r>
+          </a:p>
+          <a:p>
+            <a:r>
+              <a:rPr lang="en-US" sz="2000"/>
+              <a:t>Buttons</a:t>
+            </a:r>
+          </a:p>
+        </p:txBody>
+      </p:sp>
       <p:pic>
         <p:nvPicPr>
-          <p:cNvPr id="62" name="Inhaltsplatzhalter 3" descr="Ein Bild, das Person, drinnen, Boden, Musik enthält.&#10;&#10;Mit sehr hoher Zuverlässigkeit generierte Beschreibung">
-            <a:extLst>
-              <a:ext uri="{FF2B5EF4-FFF2-40B4-BE49-F238E27FC236}">
-                <a16:creationId xmlns:a16="http://schemas.microsoft.com/office/drawing/2014/main" id="{67A3483F-A59C-45F6-8722-A002A2073577}"/>
+          <p:cNvPr id="85" name="Graphic 84">
+            <a:extLst>
+              <a:ext uri="{FF2B5EF4-FFF2-40B4-BE49-F238E27FC236}">
+                <a16:creationId xmlns:a16="http://schemas.microsoft.com/office/drawing/2014/main" id="{553A9F82-6418-40FD-BEE6-8D0BDF800B12}"/>
+              </a:ext>
+              <a:ext uri="{C183D7F6-B498-43B3-948B-1728B52AA6E4}">
+                <adec:decorative xmlns:adec="http://schemas.microsoft.com/office/drawing/2017/decorative" val="1"/>
               </a:ext>
             </a:extLst>
           </p:cNvPr>
           <p:cNvPicPr>
-            <a:picLocks noGrp="1" noChangeAspect="1"/>
+            <a:picLocks noGrp="1" noRot="1" noChangeAspect="1" noMove="1" noResize="1" noEditPoints="1" noAdjustHandles="1" noChangeArrowheads="1" noChangeShapeType="1" noCrop="1"/>
           </p:cNvPicPr>
           <p:nvPr>
-            <p:ph idx="1"/>
+            <p:extLst>
+              <p:ext uri="{386F3935-93C4-4BCD-93E2-E3B085C9AB24}">
+                <p16:designElem xmlns:p16="http://schemas.microsoft.com/office/powerpoint/2015/main" val="1"/>
+              </p:ext>
+            </p:extLst>
           </p:nvPr>
         </p:nvPicPr>
-        <p:blipFill rotWithShape="1">
-          <a:blip r:embed="rId5">
-            <a:alphaModFix/>
+        <p:blipFill>
+          <a:blip r:embed="rId2">
+            <a:alphaModFix amt="15000"/>
             <a:extLst>
               <a:ext uri="{28A0092B-C50C-407E-A947-70E740481C1C}">
                 <a14:useLocalDpi xmlns:a14="http://schemas.microsoft.com/office/drawing/2010/main" val="0"/>
               </a:ext>
+              <a:ext uri="{96DAC541-7B7A-43D3-8B79-37D633B846F1}">
+                <asvg:svgBlip xmlns:asvg="http://schemas.microsoft.com/office/drawing/2016/SVG/main" r:embed="rId3"/>
+              </a:ext>
             </a:extLst>
           </a:blip>
-          <a:srcRect t="2447" r="-2" b="17332"/>
-          <a:stretch/>
+          <a:stretch>
+            <a:fillRect/>
+          </a:stretch>
         </p:blipFill>
         <p:spPr>
           <a:xfrm>
-            <a:off x="3834182" y="1"/>
-            <a:ext cx="4215670" cy="3381796"/>
+            <a:off x="6641431" y="816337"/>
+            <a:ext cx="5225327" cy="5225327"/>
           </a:xfrm>
-          <a:custGeom>
+          <a:prstGeom prst="rect">
             <a:avLst/>
-            <a:gdLst>
-              <a:gd name="connsiteX0" fmla="*/ 431362 w 4215670"/>
-              <a:gd name="connsiteY0" fmla="*/ 0 h 3381796"/>
-              <a:gd name="connsiteX1" fmla="*/ 3784309 w 4215670"/>
-              <a:gd name="connsiteY1" fmla="*/ 0 h 3381796"/>
-              <a:gd name="connsiteX2" fmla="*/ 3855685 w 4215670"/>
-              <a:gd name="connsiteY2" fmla="*/ 95451 h 3381796"/>
-              <a:gd name="connsiteX3" fmla="*/ 4215670 w 4215670"/>
-              <a:gd name="connsiteY3" fmla="*/ 1273961 h 3381796"/>
-              <a:gd name="connsiteX4" fmla="*/ 2107836 w 4215670"/>
-              <a:gd name="connsiteY4" fmla="*/ 3381796 h 3381796"/>
-              <a:gd name="connsiteX5" fmla="*/ 0 w 4215670"/>
-              <a:gd name="connsiteY5" fmla="*/ 1273961 h 3381796"/>
-              <a:gd name="connsiteX6" fmla="*/ 359986 w 4215670"/>
-              <a:gd name="connsiteY6" fmla="*/ 95451 h 3381796"/>
-            </a:gdLst>
-            <a:ahLst/>
-            <a:cxnLst>
-              <a:cxn ang="0">
-                <a:pos x="connsiteX0" y="connsiteY0"/>
-              </a:cxn>
-              <a:cxn ang="0">
-                <a:pos x="connsiteX1" y="connsiteY1"/>
-              </a:cxn>
-              <a:cxn ang="0">
-                <a:pos x="connsiteX2" y="connsiteY2"/>
-              </a:cxn>
-              <a:cxn ang="0">
-                <a:pos x="connsiteX3" y="connsiteY3"/>
-              </a:cxn>
-              <a:cxn ang="0">
-                <a:pos x="connsiteX4" y="connsiteY4"/>
-              </a:cxn>
-              <a:cxn ang="0">
-                <a:pos x="connsiteX5" y="connsiteY5"/>
-              </a:cxn>
-              <a:cxn ang="0">
-                <a:pos x="connsiteX6" y="connsiteY6"/>
-              </a:cxn>
-            </a:cxnLst>
-            <a:rect l="l" t="t" r="r" b="b"/>
-            <a:pathLst>
-              <a:path w="4215670" h="3381796">
-                <a:moveTo>
-                  <a:pt x="431362" y="0"/>
-                </a:moveTo>
-                <a:lnTo>
-                  <a:pt x="3784309" y="0"/>
-                </a:lnTo>
-                <a:lnTo>
-                  <a:pt x="3855685" y="95451"/>
-                </a:lnTo>
-                <a:cubicBezTo>
-                  <a:pt x="4082961" y="431863"/>
-                  <a:pt x="4215670" y="837414"/>
-                  <a:pt x="4215670" y="1273961"/>
-                </a:cubicBezTo>
-                <a:cubicBezTo>
-                  <a:pt x="4215670" y="2438087"/>
-                  <a:pt x="3271960" y="3381796"/>
-                  <a:pt x="2107836" y="3381796"/>
-                </a:cubicBezTo>
-                <a:cubicBezTo>
-                  <a:pt x="943711" y="3381796"/>
-                  <a:pt x="0" y="2438087"/>
-                  <a:pt x="0" y="1273961"/>
-                </a:cubicBezTo>
-                <a:cubicBezTo>
-                  <a:pt x="0" y="837414"/>
-                  <a:pt x="132710" y="431863"/>
-                  <a:pt x="359986" y="95451"/>
-                </a:cubicBezTo>
-                <a:close/>
-              </a:path>
-            </a:pathLst>
-          </a:custGeom>
-          <a:effectLst>
-            <a:softEdge rad="0"/>
-          </a:effectLst>
+          </a:prstGeom>
         </p:spPr>
       </p:pic>
-      <p:sp>
-        <p:nvSpPr>
-          <p:cNvPr id="2" name="Titel 1">
-            <a:extLst>
-              <a:ext uri="{FF2B5EF4-FFF2-40B4-BE49-F238E27FC236}">
-                <a16:creationId xmlns:a16="http://schemas.microsoft.com/office/drawing/2014/main" id="{9F911658-3497-45FE-B8DE-51AAAA6C7586}"/>
-              </a:ext>
-            </a:extLst>
-          </p:cNvPr>
-          <p:cNvSpPr>
-            <a:spLocks noGrp="1"/>
-          </p:cNvSpPr>
-          <p:nvPr>
-            <p:ph type="title"/>
-          </p:nvPr>
-        </p:nvSpPr>
-        <p:spPr>
-          <a:xfrm>
-            <a:off x="5190767" y="5059192"/>
-            <a:ext cx="6201111" cy="1160633"/>
-          </a:xfrm>
-        </p:spPr>
-        <p:txBody>
-          <a:bodyPr vert="horz" lIns="91440" tIns="45720" rIns="91440" bIns="45720" rtlCol="0" anchor="t">
-            <a:normAutofit/>
-          </a:bodyPr>
-          <a:lstStyle/>
-          <a:p>
-            <a:pPr algn="r"/>
-            <a:r>
-              <a:rPr lang="en-US" sz="3200" kern="1200">
-                <a:solidFill>
-                  <a:srgbClr val="000000"/>
-                </a:solidFill>
-                <a:latin typeface="+mj-lt"/>
-                <a:ea typeface="+mj-ea"/>
-                <a:cs typeface="+mj-cs"/>
-              </a:rPr>
-              <a:t>Hardware</a:t>
-            </a:r>
-          </a:p>
-        </p:txBody>
-      </p:sp>
     </p:spTree>
     <p:extLst>
       <p:ext uri="{BB962C8B-B14F-4D97-AF65-F5344CB8AC3E}">
-        <p14:creationId xmlns:p14="http://schemas.microsoft.com/office/powerpoint/2010/main" val="867894399"/>
+        <p14:creationId xmlns:p14="http://schemas.microsoft.com/office/powerpoint/2010/main" val="2373764760"/>
       </p:ext>
     </p:extLst>
   </p:cSld>
@@ -4836,21 +4666,171 @@
           <a:chExt cx="0" cy="0"/>
         </a:xfrm>
       </p:grpSpPr>
-      <p:sp useBgFill="1">
-        <p:nvSpPr>
-          <p:cNvPr id="41" name="Rectangle 40">
-            <a:extLst>
-              <a:ext uri="{FF2B5EF4-FFF2-40B4-BE49-F238E27FC236}">
-                <a16:creationId xmlns:a16="http://schemas.microsoft.com/office/drawing/2014/main" id="{3B854194-185D-494D-905C-7C7CB2E30F6E}"/>
+      <p:sp>
+        <p:nvSpPr>
+          <p:cNvPr id="2" name="Titel 1">
+            <a:extLst>
+              <a:ext uri="{FF2B5EF4-FFF2-40B4-BE49-F238E27FC236}">
+                <a16:creationId xmlns:a16="http://schemas.microsoft.com/office/drawing/2014/main" id="{9F911658-3497-45FE-B8DE-51AAAA6C7586}"/>
+              </a:ext>
+            </a:extLst>
+          </p:cNvPr>
+          <p:cNvSpPr>
+            <a:spLocks noGrp="1"/>
+          </p:cNvSpPr>
+          <p:nvPr>
+            <p:ph type="title"/>
+          </p:nvPr>
+        </p:nvSpPr>
+        <p:spPr>
+          <a:xfrm>
+            <a:off x="642996" y="4571216"/>
+            <a:ext cx="10906008" cy="1115415"/>
+          </a:xfrm>
+        </p:spPr>
+        <p:txBody>
+          <a:bodyPr vert="horz" lIns="91440" tIns="45720" rIns="91440" bIns="45720" rtlCol="0" anchor="b">
+            <a:normAutofit/>
+          </a:bodyPr>
+          <a:lstStyle/>
+          <a:p>
+            <a:pPr algn="ctr"/>
+            <a:r>
+              <a:rPr lang="en-US" sz="6000" kern="1200">
+                <a:solidFill>
+                  <a:schemeClr val="tx1"/>
+                </a:solidFill>
+                <a:latin typeface="+mj-lt"/>
+                <a:ea typeface="+mj-ea"/>
+                <a:cs typeface="+mj-cs"/>
+              </a:rPr>
+              <a:t>Hardware</a:t>
+            </a:r>
+          </a:p>
+        </p:txBody>
+      </p:sp>
+      <p:pic>
+        <p:nvPicPr>
+          <p:cNvPr id="8" name="Grafik 7">
+            <a:extLst>
+              <a:ext uri="{FF2B5EF4-FFF2-40B4-BE49-F238E27FC236}">
+                <a16:creationId xmlns:a16="http://schemas.microsoft.com/office/drawing/2014/main" id="{6A8346AC-DEF1-484F-96A1-C44A159710E0}"/>
+              </a:ext>
+            </a:extLst>
+          </p:cNvPr>
+          <p:cNvPicPr>
+            <a:picLocks noChangeAspect="1"/>
+          </p:cNvPicPr>
+          <p:nvPr/>
+        </p:nvPicPr>
+        <p:blipFill rotWithShape="1">
+          <a:blip r:embed="rId2">
+            <a:extLst>
+              <a:ext uri="{28A0092B-C50C-407E-A947-70E740481C1C}">
+                <a14:useLocalDpi xmlns:a14="http://schemas.microsoft.com/office/drawing/2010/main" val="0"/>
+              </a:ext>
+            </a:extLst>
+          </a:blip>
+          <a:srcRect l="3465" r="-5" b="-5"/>
+          <a:stretch/>
+        </p:blipFill>
+        <p:spPr>
+          <a:xfrm>
+            <a:off x="321628" y="320511"/>
+            <a:ext cx="3794760" cy="3930978"/>
+          </a:xfrm>
+          <a:prstGeom prst="rect">
+            <a:avLst/>
+          </a:prstGeom>
+        </p:spPr>
+      </p:pic>
+      <p:pic>
+        <p:nvPicPr>
+          <p:cNvPr id="6" name="Grafik 5" descr="Ein Bild, das Boden, Person, Straße, draußen enthält.&#10;&#10;Mit sehr hoher Zuverlässigkeit generierte Beschreibung">
+            <a:extLst>
+              <a:ext uri="{FF2B5EF4-FFF2-40B4-BE49-F238E27FC236}">
+                <a16:creationId xmlns:a16="http://schemas.microsoft.com/office/drawing/2014/main" id="{3D162D89-B966-4A65-B48E-E0EC307D5E40}"/>
+              </a:ext>
+            </a:extLst>
+          </p:cNvPr>
+          <p:cNvPicPr>
+            <a:picLocks noChangeAspect="1"/>
+          </p:cNvPicPr>
+          <p:nvPr/>
+        </p:nvPicPr>
+        <p:blipFill rotWithShape="1">
+          <a:blip r:embed="rId3">
+            <a:extLst>
+              <a:ext uri="{28A0092B-C50C-407E-A947-70E740481C1C}">
+                <a14:useLocalDpi xmlns:a14="http://schemas.microsoft.com/office/drawing/2010/main" val="0"/>
+              </a:ext>
+            </a:extLst>
+          </a:blip>
+          <a:srcRect l="3465" r="-5" b="-5"/>
+          <a:stretch/>
+        </p:blipFill>
+        <p:spPr>
+          <a:xfrm>
+            <a:off x="4198385" y="320511"/>
+            <a:ext cx="3794760" cy="3930978"/>
+          </a:xfrm>
+          <a:prstGeom prst="rect">
+            <a:avLst/>
+          </a:prstGeom>
+        </p:spPr>
+      </p:pic>
+      <p:pic>
+        <p:nvPicPr>
+          <p:cNvPr id="62" name="Inhaltsplatzhalter 3" descr="Ein Bild, das Person, drinnen, Boden, Musik enthält.&#10;&#10;Mit sehr hoher Zuverlässigkeit generierte Beschreibung">
+            <a:extLst>
+              <a:ext uri="{FF2B5EF4-FFF2-40B4-BE49-F238E27FC236}">
+                <a16:creationId xmlns:a16="http://schemas.microsoft.com/office/drawing/2014/main" id="{67A3483F-A59C-45F6-8722-A002A2073577}"/>
+              </a:ext>
+            </a:extLst>
+          </p:cNvPr>
+          <p:cNvPicPr>
+            <a:picLocks noGrp="1" noChangeAspect="1"/>
+          </p:cNvPicPr>
+          <p:nvPr>
+            <p:ph idx="1"/>
+          </p:nvPr>
+        </p:nvPicPr>
+        <p:blipFill rotWithShape="1">
+          <a:blip r:embed="rId4">
+            <a:extLst>
+              <a:ext uri="{28A0092B-C50C-407E-A947-70E740481C1C}">
+                <a14:useLocalDpi xmlns:a14="http://schemas.microsoft.com/office/drawing/2010/main" val="0"/>
+              </a:ext>
+            </a:extLst>
+          </a:blip>
+          <a:srcRect l="3465" r="-5" b="-5"/>
+          <a:stretch/>
+        </p:blipFill>
+        <p:spPr>
+          <a:xfrm>
+            <a:off x="8075142" y="320511"/>
+            <a:ext cx="3794760" cy="3930978"/>
+          </a:xfrm>
+          <a:prstGeom prst="rect">
+            <a:avLst/>
+          </a:prstGeom>
+        </p:spPr>
+      </p:pic>
+      <p:cxnSp>
+        <p:nvCxnSpPr>
+          <p:cNvPr id="77" name="Straight Connector 76">
+            <a:extLst>
+              <a:ext uri="{FF2B5EF4-FFF2-40B4-BE49-F238E27FC236}">
+                <a16:creationId xmlns:a16="http://schemas.microsoft.com/office/drawing/2014/main" id="{60188E89-AF78-40F6-B787-E9BD9C625686}"/>
               </a:ext>
               <a:ext uri="{C183D7F6-B498-43B3-948B-1728B52AA6E4}">
                 <adec:decorative xmlns:adec="http://schemas.microsoft.com/office/drawing/2017/decorative" val="1"/>
               </a:ext>
             </a:extLst>
           </p:cNvPr>
-          <p:cNvSpPr>
-            <a:spLocks noGrp="1" noRot="1" noChangeAspect="1" noMove="1" noResize="1" noEditPoints="1" noAdjustHandles="1" noChangeArrowheads="1" noChangeShapeType="1" noTextEdit="1"/>
-          </p:cNvSpPr>
+          <p:cNvCxnSpPr>
+            <a:cxnSpLocks noGrp="1" noRot="1" noChangeAspect="1" noMove="1" noResize="1" noEditPoints="1" noAdjustHandles="1" noChangeArrowheads="1" noChangeShapeType="1"/>
+          </p:cNvCxnSpPr>
           <p:nvPr>
             <p:extLst>
               <p:ext uri="{386F3935-93C4-4BCD-93E2-E3B085C9AB24}">
@@ -4858,291 +4838,40 @@
               </p:ext>
             </p:extLst>
           </p:nvPr>
-        </p:nvSpPr>
+        </p:nvCxnSpPr>
         <p:spPr>
           <a:xfrm>
-            <a:off x="1" y="0"/>
-            <a:ext cx="6082110" cy="6858000"/>
+            <a:off x="1524000" y="5778706"/>
+            <a:ext cx="9144000" cy="0"/>
           </a:xfrm>
-          <a:prstGeom prst="rect">
+          <a:prstGeom prst="line">
             <a:avLst/>
           </a:prstGeom>
-          <a:ln>
-            <a:noFill/>
+          <a:ln w="19050">
+            <a:solidFill>
+              <a:srgbClr val="E1BE84"/>
+            </a:solidFill>
           </a:ln>
         </p:spPr>
         <p:style>
-          <a:lnRef idx="2">
-            <a:schemeClr val="accent1">
-              <a:shade val="50000"/>
-            </a:schemeClr>
+          <a:lnRef idx="1">
+            <a:schemeClr val="accent1"/>
           </a:lnRef>
-          <a:fillRef idx="1">
+          <a:fillRef idx="0">
             <a:schemeClr val="accent1"/>
           </a:fillRef>
           <a:effectRef idx="0">
             <a:schemeClr val="accent1"/>
           </a:effectRef>
           <a:fontRef idx="minor">
-            <a:schemeClr val="lt1"/>
+            <a:schemeClr val="tx1"/>
           </a:fontRef>
         </p:style>
-        <p:txBody>
-          <a:bodyPr rtlCol="0" anchor="ctr"/>
-          <a:lstStyle/>
-          <a:p>
-            <a:pPr algn="ctr"/>
-            <a:endParaRPr lang="en-US"/>
-          </a:p>
-        </p:txBody>
-      </p:sp>
-      <p:sp>
-        <p:nvSpPr>
-          <p:cNvPr id="43" name="Rectangle 42">
-            <a:extLst>
-              <a:ext uri="{FF2B5EF4-FFF2-40B4-BE49-F238E27FC236}">
-                <a16:creationId xmlns:a16="http://schemas.microsoft.com/office/drawing/2014/main" id="{B4F5FA0D-0104-4987-8241-EFF7C85B88DE}"/>
-              </a:ext>
-              <a:ext uri="{C183D7F6-B498-43B3-948B-1728B52AA6E4}">
-                <adec:decorative xmlns:adec="http://schemas.microsoft.com/office/drawing/2017/decorative" val="1"/>
-              </a:ext>
-            </a:extLst>
-          </p:cNvPr>
-          <p:cNvSpPr>
-            <a:spLocks noGrp="1" noRot="1" noChangeAspect="1" noMove="1" noResize="1" noEditPoints="1" noAdjustHandles="1" noChangeArrowheads="1" noChangeShapeType="1" noTextEdit="1"/>
-          </p:cNvSpPr>
-          <p:nvPr>
-            <p:extLst>
-              <p:ext uri="{386F3935-93C4-4BCD-93E2-E3B085C9AB24}">
-                <p16:designElem xmlns:p16="http://schemas.microsoft.com/office/powerpoint/2015/main" val="1"/>
-              </p:ext>
-            </p:extLst>
-          </p:nvPr>
-        </p:nvSpPr>
-        <p:spPr>
-          <a:xfrm>
-            <a:off x="1" y="0"/>
-            <a:ext cx="12191998" cy="6858000"/>
-          </a:xfrm>
-          <a:prstGeom prst="rect">
-            <a:avLst/>
-          </a:prstGeom>
-          <a:gradFill>
-            <a:gsLst>
-              <a:gs pos="0">
-                <a:schemeClr val="accent1">
-                  <a:lumMod val="90000"/>
-                </a:schemeClr>
-              </a:gs>
-              <a:gs pos="25000">
-                <a:schemeClr val="accent1">
-                  <a:lumMod val="90000"/>
-                </a:schemeClr>
-              </a:gs>
-              <a:gs pos="94000">
-                <a:schemeClr val="bg2">
-                  <a:lumMod val="25000"/>
-                </a:schemeClr>
-              </a:gs>
-              <a:gs pos="100000">
-                <a:schemeClr val="bg2">
-                  <a:lumMod val="25000"/>
-                </a:schemeClr>
-              </a:gs>
-            </a:gsLst>
-            <a:lin ang="4200000" scaled="0"/>
-          </a:gradFill>
-          <a:ln>
-            <a:noFill/>
-          </a:ln>
-        </p:spPr>
-        <p:style>
-          <a:lnRef idx="2">
-            <a:schemeClr val="accent1">
-              <a:shade val="50000"/>
-            </a:schemeClr>
-          </a:lnRef>
-          <a:fillRef idx="1">
-            <a:schemeClr val="accent1"/>
-          </a:fillRef>
-          <a:effectRef idx="0">
-            <a:schemeClr val="accent1"/>
-          </a:effectRef>
-          <a:fontRef idx="minor">
-            <a:schemeClr val="lt1"/>
-          </a:fontRef>
-        </p:style>
-        <p:txBody>
-          <a:bodyPr rtlCol="0" anchor="ctr"/>
-          <a:lstStyle/>
-          <a:p>
-            <a:pPr algn="ctr"/>
-            <a:endParaRPr lang="en-US"/>
-          </a:p>
-        </p:txBody>
-      </p:sp>
-      <p:pic>
-        <p:nvPicPr>
-          <p:cNvPr id="45" name="Picture 44">
-            <a:extLst>
-              <a:ext uri="{FF2B5EF4-FFF2-40B4-BE49-F238E27FC236}">
-                <a16:creationId xmlns:a16="http://schemas.microsoft.com/office/drawing/2014/main" id="{2897127E-6CEF-446C-BE87-93B7C46E49D1}"/>
-              </a:ext>
-              <a:ext uri="{C183D7F6-B498-43B3-948B-1728B52AA6E4}">
-                <adec:decorative xmlns:adec="http://schemas.microsoft.com/office/drawing/2017/decorative" val="1"/>
-              </a:ext>
-            </a:extLst>
-          </p:cNvPr>
-          <p:cNvPicPr>
-            <a:picLocks noGrp="1" noRot="1" noChangeAspect="1" noMove="1" noResize="1" noEditPoints="1" noAdjustHandles="1" noChangeArrowheads="1" noChangeShapeType="1" noCrop="1"/>
-          </p:cNvPicPr>
-          <p:nvPr>
-            <p:extLst>
-              <p:ext uri="{386F3935-93C4-4BCD-93E2-E3B085C9AB24}">
-                <p16:designElem xmlns:p16="http://schemas.microsoft.com/office/powerpoint/2015/main" val="1"/>
-              </p:ext>
-            </p:extLst>
-          </p:nvPr>
-        </p:nvPicPr>
-        <p:blipFill>
-          <a:blip r:embed="rId2">
-            <a:extLst>
-              <a:ext uri="{28A0092B-C50C-407E-A947-70E740481C1C}">
-                <a14:useLocalDpi xmlns:a14="http://schemas.microsoft.com/office/drawing/2010/main" val="0"/>
-              </a:ext>
-            </a:extLst>
-          </a:blip>
-          <a:stretch>
-            <a:fillRect/>
-          </a:stretch>
-        </p:blipFill>
-        <p:spPr>
-          <a:xfrm>
-            <a:off x="0" y="0"/>
-            <a:ext cx="12192000" cy="6858000"/>
-          </a:xfrm>
-          <a:prstGeom prst="rect">
-            <a:avLst/>
-          </a:prstGeom>
-        </p:spPr>
-      </p:pic>
-      <p:sp>
-        <p:nvSpPr>
-          <p:cNvPr id="2" name="Titel 1">
-            <a:extLst>
-              <a:ext uri="{FF2B5EF4-FFF2-40B4-BE49-F238E27FC236}">
-                <a16:creationId xmlns:a16="http://schemas.microsoft.com/office/drawing/2014/main" id="{9F911658-3497-45FE-B8DE-51AAAA6C7586}"/>
-              </a:ext>
-            </a:extLst>
-          </p:cNvPr>
-          <p:cNvSpPr>
-            <a:spLocks noGrp="1"/>
-          </p:cNvSpPr>
-          <p:nvPr>
-            <p:ph type="title"/>
-          </p:nvPr>
-        </p:nvSpPr>
-        <p:spPr>
-          <a:xfrm>
-            <a:off x="640079" y="2053641"/>
-            <a:ext cx="3669161" cy="2760098"/>
-          </a:xfrm>
-        </p:spPr>
-        <p:txBody>
-          <a:bodyPr>
-            <a:normAutofit/>
-          </a:bodyPr>
-          <a:lstStyle/>
-          <a:p>
-            <a:r>
-              <a:rPr lang="en-GB">
-                <a:solidFill>
-                  <a:srgbClr val="FFFFFF"/>
-                </a:solidFill>
-              </a:rPr>
-              <a:t>Problems on the way</a:t>
-            </a:r>
-            <a:endParaRPr lang="en-GB" dirty="0">
-              <a:solidFill>
-                <a:srgbClr val="FFFFFF"/>
-              </a:solidFill>
-            </a:endParaRPr>
-          </a:p>
-        </p:txBody>
-      </p:sp>
-      <p:sp>
-        <p:nvSpPr>
-          <p:cNvPr id="52" name="Content Placeholder 9">
-            <a:extLst>
-              <a:ext uri="{FF2B5EF4-FFF2-40B4-BE49-F238E27FC236}">
-                <a16:creationId xmlns:a16="http://schemas.microsoft.com/office/drawing/2014/main" id="{2CB2D89F-CCCF-4F2B-9968-21C18C3406DE}"/>
-              </a:ext>
-            </a:extLst>
-          </p:cNvPr>
-          <p:cNvSpPr>
-            <a:spLocks noGrp="1"/>
-          </p:cNvSpPr>
-          <p:nvPr>
-            <p:ph idx="1"/>
-          </p:nvPr>
-        </p:nvSpPr>
-        <p:spPr>
-          <a:xfrm>
-            <a:off x="6090574" y="801866"/>
-            <a:ext cx="5306084" cy="5230634"/>
-          </a:xfrm>
-        </p:spPr>
-        <p:txBody>
-          <a:bodyPr anchor="ctr">
-            <a:normAutofit/>
-          </a:bodyPr>
-          <a:lstStyle/>
-          <a:p>
-            <a:r>
-              <a:rPr lang="en-US" sz="2400">
-                <a:solidFill>
-                  <a:srgbClr val="000000"/>
-                </a:solidFill>
-              </a:rPr>
-              <a:t>Too long strip</a:t>
-            </a:r>
-          </a:p>
-          <a:p>
-            <a:r>
-              <a:rPr lang="en-US" sz="2400">
-                <a:solidFill>
-                  <a:srgbClr val="000000"/>
-                </a:solidFill>
-              </a:rPr>
-              <a:t>Not enough power</a:t>
-            </a:r>
-          </a:p>
-          <a:p>
-            <a:r>
-              <a:rPr lang="en-US" sz="2400">
-                <a:solidFill>
-                  <a:srgbClr val="000000"/>
-                </a:solidFill>
-              </a:rPr>
-              <a:t>Flickering</a:t>
-            </a:r>
-          </a:p>
-          <a:p>
-            <a:r>
-              <a:rPr lang="en-US" sz="2400">
-                <a:solidFill>
-                  <a:srgbClr val="000000"/>
-                </a:solidFill>
-              </a:rPr>
-              <a:t>Buttons</a:t>
-            </a:r>
-          </a:p>
-        </p:txBody>
-      </p:sp>
+      </p:cxnSp>
     </p:spTree>
     <p:extLst>
       <p:ext uri="{BB962C8B-B14F-4D97-AF65-F5344CB8AC3E}">
-        <p14:creationId xmlns:p14="http://schemas.microsoft.com/office/powerpoint/2010/main" val="586020942"/>
+        <p14:creationId xmlns:p14="http://schemas.microsoft.com/office/powerpoint/2010/main" val="867894399"/>
       </p:ext>
     </p:extLst>
   </p:cSld>
@@ -5185,12 +4914,47 @@
           <a:chExt cx="0" cy="0"/>
         </a:xfrm>
       </p:grpSpPr>
-      <p:sp useBgFill="1">
-        <p:nvSpPr>
-          <p:cNvPr id="41" name="Rectangle 40">
-            <a:extLst>
-              <a:ext uri="{FF2B5EF4-FFF2-40B4-BE49-F238E27FC236}">
-                <a16:creationId xmlns:a16="http://schemas.microsoft.com/office/drawing/2014/main" id="{3B854194-185D-494D-905C-7C7CB2E30F6E}"/>
+      <p:pic>
+        <p:nvPicPr>
+          <p:cNvPr id="6" name="Grafik 5" descr="Ein Bild, das Boden, drinnen, rot, sitzend enthält.&#10;&#10;Mit sehr hoher Zuverlässigkeit generierte Beschreibung">
+            <a:extLst>
+              <a:ext uri="{FF2B5EF4-FFF2-40B4-BE49-F238E27FC236}">
+                <a16:creationId xmlns:a16="http://schemas.microsoft.com/office/drawing/2014/main" id="{0B8A8427-A142-4430-B17E-A5B39ACB38BB}"/>
+              </a:ext>
+            </a:extLst>
+          </p:cNvPr>
+          <p:cNvPicPr>
+            <a:picLocks noChangeAspect="1"/>
+          </p:cNvPicPr>
+          <p:nvPr/>
+        </p:nvPicPr>
+        <p:blipFill rotWithShape="1">
+          <a:blip r:embed="rId2">
+            <a:extLst>
+              <a:ext uri="{28A0092B-C50C-407E-A947-70E740481C1C}">
+                <a14:useLocalDpi xmlns:a14="http://schemas.microsoft.com/office/drawing/2010/main" val="0"/>
+              </a:ext>
+            </a:extLst>
+          </a:blip>
+          <a:srcRect t="16497" b="8503"/>
+          <a:stretch/>
+        </p:blipFill>
+        <p:spPr>
+          <a:xfrm>
+            <a:off x="-1" y="10"/>
+            <a:ext cx="12192000" cy="6857990"/>
+          </a:xfrm>
+          <a:prstGeom prst="rect">
+            <a:avLst/>
+          </a:prstGeom>
+        </p:spPr>
+      </p:pic>
+      <p:sp>
+        <p:nvSpPr>
+          <p:cNvPr id="77" name="Freeform 5">
+            <a:extLst>
+              <a:ext uri="{FF2B5EF4-FFF2-40B4-BE49-F238E27FC236}">
+                <a16:creationId xmlns:a16="http://schemas.microsoft.com/office/drawing/2014/main" id="{3CD9DF72-87A3-404E-A828-84CBF11A8303}"/>
               </a:ext>
               <a:ext uri="{C183D7F6-B498-43B3-948B-1728B52AA6E4}">
                 <adec:decorative xmlns:adec="http://schemas.microsoft.com/office/drawing/2017/decorative" val="1"/>
@@ -5208,232 +4972,238 @@
             </p:extLst>
           </p:nvPr>
         </p:nvSpPr>
+        <p:spPr bwMode="grayWhite">
+          <a:xfrm flipH="1">
+            <a:off x="0" y="998175"/>
+            <a:ext cx="6017172" cy="5859825"/>
+          </a:xfrm>
+          <a:custGeom>
+            <a:avLst/>
+            <a:gdLst>
+              <a:gd name="T0" fmla="*/ 1333 w 1333"/>
+              <a:gd name="T1" fmla="*/ 1031 h 1298"/>
+              <a:gd name="T2" fmla="*/ 1333 w 1333"/>
+              <a:gd name="T3" fmla="*/ 380 h 1298"/>
+              <a:gd name="T4" fmla="*/ 706 w 1333"/>
+              <a:gd name="T5" fmla="*/ 0 h 1298"/>
+              <a:gd name="T6" fmla="*/ 0 w 1333"/>
+              <a:gd name="T7" fmla="*/ 706 h 1298"/>
+              <a:gd name="T8" fmla="*/ 323 w 1333"/>
+              <a:gd name="T9" fmla="*/ 1298 h 1298"/>
+              <a:gd name="T10" fmla="*/ 1090 w 1333"/>
+              <a:gd name="T11" fmla="*/ 1298 h 1298"/>
+              <a:gd name="T12" fmla="*/ 1333 w 1333"/>
+              <a:gd name="T13" fmla="*/ 1031 h 1298"/>
+            </a:gdLst>
+            <a:ahLst/>
+            <a:cxnLst>
+              <a:cxn ang="0">
+                <a:pos x="T0" y="T1"/>
+              </a:cxn>
+              <a:cxn ang="0">
+                <a:pos x="T2" y="T3"/>
+              </a:cxn>
+              <a:cxn ang="0">
+                <a:pos x="T4" y="T5"/>
+              </a:cxn>
+              <a:cxn ang="0">
+                <a:pos x="T6" y="T7"/>
+              </a:cxn>
+              <a:cxn ang="0">
+                <a:pos x="T8" y="T9"/>
+              </a:cxn>
+              <a:cxn ang="0">
+                <a:pos x="T10" y="T11"/>
+              </a:cxn>
+              <a:cxn ang="0">
+                <a:pos x="T12" y="T13"/>
+              </a:cxn>
+            </a:cxnLst>
+            <a:rect l="0" t="0" r="r" b="b"/>
+            <a:pathLst>
+              <a:path w="1333" h="1298">
+                <a:moveTo>
+                  <a:pt x="1333" y="1031"/>
+                </a:moveTo>
+                <a:cubicBezTo>
+                  <a:pt x="1333" y="380"/>
+                  <a:pt x="1333" y="380"/>
+                  <a:pt x="1333" y="380"/>
+                </a:cubicBezTo>
+                <a:cubicBezTo>
+                  <a:pt x="1215" y="154"/>
+                  <a:pt x="979" y="0"/>
+                  <a:pt x="706" y="0"/>
+                </a:cubicBezTo>
+                <a:cubicBezTo>
+                  <a:pt x="317" y="0"/>
+                  <a:pt x="0" y="316"/>
+                  <a:pt x="0" y="706"/>
+                </a:cubicBezTo>
+                <a:cubicBezTo>
+                  <a:pt x="0" y="954"/>
+                  <a:pt x="129" y="1172"/>
+                  <a:pt x="323" y="1298"/>
+                </a:cubicBezTo>
+                <a:cubicBezTo>
+                  <a:pt x="1090" y="1298"/>
+                  <a:pt x="1090" y="1298"/>
+                  <a:pt x="1090" y="1298"/>
+                </a:cubicBezTo>
+                <a:cubicBezTo>
+                  <a:pt x="1193" y="1232"/>
+                  <a:pt x="1276" y="1140"/>
+                  <a:pt x="1333" y="1031"/>
+                </a:cubicBezTo>
+                <a:close/>
+              </a:path>
+            </a:pathLst>
+          </a:custGeom>
+          <a:solidFill>
+            <a:schemeClr val="bg1">
+              <a:alpha val="75000"/>
+            </a:schemeClr>
+          </a:solidFill>
+          <a:ln w="50800" cap="sq" cmpd="dbl">
+            <a:noFill/>
+            <a:miter lim="800000"/>
+          </a:ln>
+          <a:effectLst/>
+          <a:extLst/>
+        </p:spPr>
+        <p:txBody>
+          <a:bodyPr vert="horz" lIns="91440" tIns="45720" rIns="91440" bIns="45720" rtlCol="0" anchor="t">
+            <a:normAutofit/>
+          </a:bodyPr>
+          <a:lstStyle/>
+          <a:p>
+            <a:pPr algn="ctr">
+              <a:spcAft>
+                <a:spcPts val="1000"/>
+              </a:spcAft>
+              <a:buClr>
+                <a:schemeClr val="tx1"/>
+              </a:buClr>
+              <a:buSzPct val="100000"/>
+              <a:buFont typeface="Arial"/>
+              <a:buNone/>
+            </a:pPr>
+            <a:endParaRPr lang="en-US" sz="1600" cap="all"/>
+          </a:p>
+        </p:txBody>
+      </p:sp>
+      <p:sp>
+        <p:nvSpPr>
+          <p:cNvPr id="2" name="Titel 1">
+            <a:extLst>
+              <a:ext uri="{FF2B5EF4-FFF2-40B4-BE49-F238E27FC236}">
+                <a16:creationId xmlns:a16="http://schemas.microsoft.com/office/drawing/2014/main" id="{9F911658-3497-45FE-B8DE-51AAAA6C7586}"/>
+              </a:ext>
+            </a:extLst>
+          </p:cNvPr>
+          <p:cNvSpPr>
+            <a:spLocks noGrp="1"/>
+          </p:cNvSpPr>
+          <p:nvPr>
+            <p:ph type="title"/>
+          </p:nvPr>
+        </p:nvSpPr>
         <p:spPr>
           <a:xfrm>
-            <a:off x="1" y="0"/>
-            <a:ext cx="6082110" cy="6858000"/>
+            <a:off x="709448" y="1913950"/>
+            <a:ext cx="4204137" cy="1342754"/>
           </a:xfrm>
-          <a:prstGeom prst="rect">
+        </p:spPr>
+        <p:txBody>
+          <a:bodyPr>
+            <a:normAutofit/>
+          </a:bodyPr>
+          <a:lstStyle/>
+          <a:p>
+            <a:pPr algn="ctr"/>
+            <a:r>
+              <a:rPr lang="en-GB" sz="3600"/>
+              <a:t>Problems on the way</a:t>
+            </a:r>
+          </a:p>
+        </p:txBody>
+      </p:sp>
+      <p:cxnSp>
+        <p:nvCxnSpPr>
+          <p:cNvPr id="79" name="Straight Connector 78">
+            <a:extLst>
+              <a:ext uri="{FF2B5EF4-FFF2-40B4-BE49-F238E27FC236}">
+                <a16:creationId xmlns:a16="http://schemas.microsoft.com/office/drawing/2014/main" id="{20E3A342-4D61-4E3F-AF90-1AB42AEB96CC}"/>
+              </a:ext>
+              <a:ext uri="{C183D7F6-B498-43B3-948B-1728B52AA6E4}">
+                <adec:decorative xmlns:adec="http://schemas.microsoft.com/office/drawing/2017/decorative" val="1"/>
+              </a:ext>
+            </a:extLst>
+          </p:cNvPr>
+          <p:cNvCxnSpPr>
+            <a:cxnSpLocks noGrp="1" noRot="1" noChangeAspect="1" noMove="1" noResize="1" noEditPoints="1" noAdjustHandles="1" noChangeArrowheads="1" noChangeShapeType="1"/>
+          </p:cNvCxnSpPr>
+          <p:nvPr>
+            <p:extLst>
+              <p:ext uri="{386F3935-93C4-4BCD-93E2-E3B085C9AB24}">
+                <p16:designElem xmlns:p16="http://schemas.microsoft.com/office/powerpoint/2015/main" val="1"/>
+              </p:ext>
+            </p:extLst>
+          </p:nvPr>
+        </p:nvCxnSpPr>
+        <p:spPr>
+          <a:xfrm>
+            <a:off x="2287051" y="3337139"/>
+            <a:ext cx="935420" cy="0"/>
+          </a:xfrm>
+          <a:prstGeom prst="line">
             <a:avLst/>
           </a:prstGeom>
-          <a:ln>
-            <a:noFill/>
+          <a:ln w="25400" cap="sq">
+            <a:solidFill>
+              <a:schemeClr val="tx1">
+                <a:lumMod val="85000"/>
+                <a:lumOff val="15000"/>
+              </a:schemeClr>
+            </a:solidFill>
+            <a:bevel/>
           </a:ln>
         </p:spPr>
         <p:style>
-          <a:lnRef idx="2">
-            <a:schemeClr val="accent1">
-              <a:shade val="50000"/>
-            </a:schemeClr>
+          <a:lnRef idx="1">
+            <a:schemeClr val="accent1"/>
           </a:lnRef>
-          <a:fillRef idx="1">
+          <a:fillRef idx="0">
             <a:schemeClr val="accent1"/>
           </a:fillRef>
           <a:effectRef idx="0">
             <a:schemeClr val="accent1"/>
           </a:effectRef>
           <a:fontRef idx="minor">
-            <a:schemeClr val="lt1"/>
+            <a:schemeClr val="tx1"/>
           </a:fontRef>
         </p:style>
-        <p:txBody>
-          <a:bodyPr rtlCol="0" anchor="ctr"/>
-          <a:lstStyle/>
-          <a:p>
-            <a:pPr algn="ctr"/>
-            <a:endParaRPr lang="en-US"/>
-          </a:p>
-        </p:txBody>
-      </p:sp>
-      <p:sp>
-        <p:nvSpPr>
-          <p:cNvPr id="43" name="Rectangle 42">
-            <a:extLst>
-              <a:ext uri="{FF2B5EF4-FFF2-40B4-BE49-F238E27FC236}">
-                <a16:creationId xmlns:a16="http://schemas.microsoft.com/office/drawing/2014/main" id="{B4F5FA0D-0104-4987-8241-EFF7C85B88DE}"/>
-              </a:ext>
-              <a:ext uri="{C183D7F6-B498-43B3-948B-1728B52AA6E4}">
-                <adec:decorative xmlns:adec="http://schemas.microsoft.com/office/drawing/2017/decorative" val="1"/>
-              </a:ext>
-            </a:extLst>
-          </p:cNvPr>
-          <p:cNvSpPr>
-            <a:spLocks noGrp="1" noRot="1" noChangeAspect="1" noMove="1" noResize="1" noEditPoints="1" noAdjustHandles="1" noChangeArrowheads="1" noChangeShapeType="1" noTextEdit="1"/>
-          </p:cNvSpPr>
-          <p:nvPr>
-            <p:extLst>
-              <p:ext uri="{386F3935-93C4-4BCD-93E2-E3B085C9AB24}">
-                <p16:designElem xmlns:p16="http://schemas.microsoft.com/office/powerpoint/2015/main" val="1"/>
-              </p:ext>
-            </p:extLst>
+      </p:cxnSp>
+      <p:sp>
+        <p:nvSpPr>
+          <p:cNvPr id="52" name="Content Placeholder 9">
+            <a:extLst>
+              <a:ext uri="{FF2B5EF4-FFF2-40B4-BE49-F238E27FC236}">
+                <a16:creationId xmlns:a16="http://schemas.microsoft.com/office/drawing/2014/main" id="{2CB2D89F-CCCF-4F2B-9968-21C18C3406DE}"/>
+              </a:ext>
+            </a:extLst>
+          </p:cNvPr>
+          <p:cNvSpPr>
+            <a:spLocks noGrp="1"/>
+          </p:cNvSpPr>
+          <p:nvPr>
+            <p:ph idx="1"/>
           </p:nvPr>
         </p:nvSpPr>
         <p:spPr>
           <a:xfrm>
-            <a:off x="1" y="0"/>
-            <a:ext cx="12191998" cy="6858000"/>
-          </a:xfrm>
-          <a:prstGeom prst="rect">
-            <a:avLst/>
-          </a:prstGeom>
-          <a:gradFill>
-            <a:gsLst>
-              <a:gs pos="0">
-                <a:schemeClr val="accent1">
-                  <a:lumMod val="90000"/>
-                </a:schemeClr>
-              </a:gs>
-              <a:gs pos="25000">
-                <a:schemeClr val="accent1">
-                  <a:lumMod val="90000"/>
-                </a:schemeClr>
-              </a:gs>
-              <a:gs pos="94000">
-                <a:schemeClr val="bg2">
-                  <a:lumMod val="25000"/>
-                </a:schemeClr>
-              </a:gs>
-              <a:gs pos="100000">
-                <a:schemeClr val="bg2">
-                  <a:lumMod val="25000"/>
-                </a:schemeClr>
-              </a:gs>
-            </a:gsLst>
-            <a:lin ang="4200000" scaled="0"/>
-          </a:gradFill>
-          <a:ln>
-            <a:noFill/>
-          </a:ln>
-        </p:spPr>
-        <p:style>
-          <a:lnRef idx="2">
-            <a:schemeClr val="accent1">
-              <a:shade val="50000"/>
-            </a:schemeClr>
-          </a:lnRef>
-          <a:fillRef idx="1">
-            <a:schemeClr val="accent1"/>
-          </a:fillRef>
-          <a:effectRef idx="0">
-            <a:schemeClr val="accent1"/>
-          </a:effectRef>
-          <a:fontRef idx="minor">
-            <a:schemeClr val="lt1"/>
-          </a:fontRef>
-        </p:style>
-        <p:txBody>
-          <a:bodyPr rtlCol="0" anchor="ctr"/>
-          <a:lstStyle/>
-          <a:p>
-            <a:pPr algn="ctr"/>
-            <a:endParaRPr lang="en-US"/>
-          </a:p>
-        </p:txBody>
-      </p:sp>
-      <p:pic>
-        <p:nvPicPr>
-          <p:cNvPr id="45" name="Picture 44">
-            <a:extLst>
-              <a:ext uri="{FF2B5EF4-FFF2-40B4-BE49-F238E27FC236}">
-                <a16:creationId xmlns:a16="http://schemas.microsoft.com/office/drawing/2014/main" id="{2897127E-6CEF-446C-BE87-93B7C46E49D1}"/>
-              </a:ext>
-              <a:ext uri="{C183D7F6-B498-43B3-948B-1728B52AA6E4}">
-                <adec:decorative xmlns:adec="http://schemas.microsoft.com/office/drawing/2017/decorative" val="1"/>
-              </a:ext>
-            </a:extLst>
-          </p:cNvPr>
-          <p:cNvPicPr>
-            <a:picLocks noGrp="1" noRot="1" noChangeAspect="1" noMove="1" noResize="1" noEditPoints="1" noAdjustHandles="1" noChangeArrowheads="1" noChangeShapeType="1" noCrop="1"/>
-          </p:cNvPicPr>
-          <p:nvPr>
-            <p:extLst>
-              <p:ext uri="{386F3935-93C4-4BCD-93E2-E3B085C9AB24}">
-                <p16:designElem xmlns:p16="http://schemas.microsoft.com/office/powerpoint/2015/main" val="1"/>
-              </p:ext>
-            </p:extLst>
-          </p:nvPr>
-        </p:nvPicPr>
-        <p:blipFill>
-          <a:blip r:embed="rId2">
-            <a:extLst>
-              <a:ext uri="{28A0092B-C50C-407E-A947-70E740481C1C}">
-                <a14:useLocalDpi xmlns:a14="http://schemas.microsoft.com/office/drawing/2010/main" val="0"/>
-              </a:ext>
-            </a:extLst>
-          </a:blip>
-          <a:stretch>
-            <a:fillRect/>
-          </a:stretch>
-        </p:blipFill>
-        <p:spPr>
-          <a:xfrm>
-            <a:off x="0" y="0"/>
-            <a:ext cx="12192000" cy="6858000"/>
-          </a:xfrm>
-          <a:prstGeom prst="rect">
-            <a:avLst/>
-          </a:prstGeom>
-        </p:spPr>
-      </p:pic>
-      <p:sp>
-        <p:nvSpPr>
-          <p:cNvPr id="2" name="Titel 1">
-            <a:extLst>
-              <a:ext uri="{FF2B5EF4-FFF2-40B4-BE49-F238E27FC236}">
-                <a16:creationId xmlns:a16="http://schemas.microsoft.com/office/drawing/2014/main" id="{9F911658-3497-45FE-B8DE-51AAAA6C7586}"/>
-              </a:ext>
-            </a:extLst>
-          </p:cNvPr>
-          <p:cNvSpPr>
-            <a:spLocks noGrp="1"/>
-          </p:cNvSpPr>
-          <p:nvPr>
-            <p:ph type="title"/>
-          </p:nvPr>
-        </p:nvSpPr>
-        <p:spPr>
-          <a:xfrm>
-            <a:off x="640079" y="2053641"/>
-            <a:ext cx="3669161" cy="2760098"/>
-          </a:xfrm>
-        </p:spPr>
-        <p:txBody>
-          <a:bodyPr>
-            <a:normAutofit/>
-          </a:bodyPr>
-          <a:lstStyle/>
-          <a:p>
-            <a:r>
-              <a:rPr lang="en-GB">
-                <a:solidFill>
-                  <a:srgbClr val="FFFFFF"/>
-                </a:solidFill>
-              </a:rPr>
-              <a:t>Lessons Learned</a:t>
-            </a:r>
-          </a:p>
-        </p:txBody>
-      </p:sp>
-      <p:sp>
-        <p:nvSpPr>
-          <p:cNvPr id="10" name="Content Placeholder 9">
-            <a:extLst>
-              <a:ext uri="{FF2B5EF4-FFF2-40B4-BE49-F238E27FC236}">
-                <a16:creationId xmlns:a16="http://schemas.microsoft.com/office/drawing/2014/main" id="{2CB2D89F-CCCF-4F2B-9968-21C18C3406DE}"/>
-              </a:ext>
-            </a:extLst>
-          </p:cNvPr>
-          <p:cNvSpPr>
-            <a:spLocks noGrp="1"/>
-          </p:cNvSpPr>
-          <p:nvPr>
-            <p:ph idx="1"/>
-          </p:nvPr>
-        </p:nvSpPr>
-        <p:spPr>
-          <a:xfrm>
-            <a:off x="6090574" y="801866"/>
-            <a:ext cx="5306084" cy="5230634"/>
+            <a:off x="525516" y="3417573"/>
+            <a:ext cx="4593021" cy="2619839"/>
           </a:xfrm>
         </p:spPr>
         <p:txBody>
@@ -5443,47 +5213,34 @@
           <a:lstStyle/>
           <a:p>
             <a:r>
-              <a:rPr lang="en-US" sz="2400" dirty="0">
-                <a:solidFill>
-                  <a:srgbClr val="000000"/>
-                </a:solidFill>
-              </a:rPr>
-              <a:t>Code-and-Fix</a:t>
-            </a:r>
-          </a:p>
-          <a:p>
-            <a:r>
-              <a:rPr lang="en-US" sz="2400" dirty="0">
-                <a:solidFill>
-                  <a:srgbClr val="000000"/>
-                </a:solidFill>
-              </a:rPr>
-              <a:t>More Brainstorming</a:t>
-            </a:r>
-          </a:p>
-          <a:p>
-            <a:r>
-              <a:rPr lang="en-US" sz="2400" dirty="0">
-                <a:solidFill>
-                  <a:srgbClr val="000000"/>
-                </a:solidFill>
-              </a:rPr>
-              <a:t>Take notes</a:t>
-            </a:r>
-          </a:p>
-          <a:p>
-            <a:endParaRPr lang="en-US" sz="2400" dirty="0">
-              <a:solidFill>
-                <a:srgbClr val="000000"/>
-              </a:solidFill>
-            </a:endParaRPr>
+              <a:rPr lang="en-US" sz="1800"/>
+              <a:t>Too long strip</a:t>
+            </a:r>
+          </a:p>
+          <a:p>
+            <a:r>
+              <a:rPr lang="en-US" sz="1800"/>
+              <a:t>Not enough power</a:t>
+            </a:r>
+          </a:p>
+          <a:p>
+            <a:r>
+              <a:rPr lang="en-US" sz="1800"/>
+              <a:t>Flickering</a:t>
+            </a:r>
+          </a:p>
+          <a:p>
+            <a:r>
+              <a:rPr lang="en-US" sz="1800"/>
+              <a:t>Buttons</a:t>
+            </a:r>
           </a:p>
         </p:txBody>
       </p:sp>
     </p:spTree>
     <p:extLst>
       <p:ext uri="{BB962C8B-B14F-4D97-AF65-F5344CB8AC3E}">
-        <p14:creationId xmlns:p14="http://schemas.microsoft.com/office/powerpoint/2010/main" val="1157231479"/>
+        <p14:creationId xmlns:p14="http://schemas.microsoft.com/office/powerpoint/2010/main" val="586020942"/>
       </p:ext>
     </p:extLst>
   </p:cSld>
@@ -5526,12 +5283,47 @@
           <a:chExt cx="0" cy="0"/>
         </a:xfrm>
       </p:grpSpPr>
-      <p:sp>
-        <p:nvSpPr>
-          <p:cNvPr id="15" name="Rectangle 14">
-            <a:extLst>
-              <a:ext uri="{FF2B5EF4-FFF2-40B4-BE49-F238E27FC236}">
-                <a16:creationId xmlns:a16="http://schemas.microsoft.com/office/drawing/2014/main" id="{B4F5FA0D-0104-4987-8241-EFF7C85B88DE}"/>
+      <p:pic>
+        <p:nvPicPr>
+          <p:cNvPr id="4" name="Grafik 3" descr="Ein Bild, das Boden, drinnen, rot, sitzend enthält.&#10;&#10;Mit sehr hoher Zuverlässigkeit generierte Beschreibung">
+            <a:extLst>
+              <a:ext uri="{FF2B5EF4-FFF2-40B4-BE49-F238E27FC236}">
+                <a16:creationId xmlns:a16="http://schemas.microsoft.com/office/drawing/2014/main" id="{31DC2CF7-D39B-4C82-999D-205421B5D769}"/>
+              </a:ext>
+            </a:extLst>
+          </p:cNvPr>
+          <p:cNvPicPr>
+            <a:picLocks noChangeAspect="1"/>
+          </p:cNvPicPr>
+          <p:nvPr/>
+        </p:nvPicPr>
+        <p:blipFill rotWithShape="1">
+          <a:blip r:embed="rId2">
+            <a:extLst>
+              <a:ext uri="{28A0092B-C50C-407E-A947-70E740481C1C}">
+                <a14:useLocalDpi xmlns:a14="http://schemas.microsoft.com/office/drawing/2010/main" val="0"/>
+              </a:ext>
+            </a:extLst>
+          </a:blip>
+          <a:srcRect t="16497" b="8503"/>
+          <a:stretch/>
+        </p:blipFill>
+        <p:spPr>
+          <a:xfrm>
+            <a:off x="-1" y="10"/>
+            <a:ext cx="12192000" cy="6857990"/>
+          </a:xfrm>
+          <a:prstGeom prst="rect">
+            <a:avLst/>
+          </a:prstGeom>
+        </p:spPr>
+      </p:pic>
+      <p:sp>
+        <p:nvSpPr>
+          <p:cNvPr id="57" name="Freeform 5">
+            <a:extLst>
+              <a:ext uri="{FF2B5EF4-FFF2-40B4-BE49-F238E27FC236}">
+                <a16:creationId xmlns:a16="http://schemas.microsoft.com/office/drawing/2014/main" id="{3CD9DF72-87A3-404E-A828-84CBF11A8303}"/>
               </a:ext>
               <a:ext uri="{C183D7F6-B498-43B3-948B-1728B52AA6E4}">
                 <adec:decorative xmlns:adec="http://schemas.microsoft.com/office/drawing/2017/decorative" val="1"/>
@@ -5549,92 +5341,331 @@
             </p:extLst>
           </p:nvPr>
         </p:nvSpPr>
+        <p:spPr bwMode="grayWhite">
+          <a:xfrm flipH="1">
+            <a:off x="0" y="998175"/>
+            <a:ext cx="6017172" cy="5859825"/>
+          </a:xfrm>
+          <a:custGeom>
+            <a:avLst/>
+            <a:gdLst>
+              <a:gd name="T0" fmla="*/ 1333 w 1333"/>
+              <a:gd name="T1" fmla="*/ 1031 h 1298"/>
+              <a:gd name="T2" fmla="*/ 1333 w 1333"/>
+              <a:gd name="T3" fmla="*/ 380 h 1298"/>
+              <a:gd name="T4" fmla="*/ 706 w 1333"/>
+              <a:gd name="T5" fmla="*/ 0 h 1298"/>
+              <a:gd name="T6" fmla="*/ 0 w 1333"/>
+              <a:gd name="T7" fmla="*/ 706 h 1298"/>
+              <a:gd name="T8" fmla="*/ 323 w 1333"/>
+              <a:gd name="T9" fmla="*/ 1298 h 1298"/>
+              <a:gd name="T10" fmla="*/ 1090 w 1333"/>
+              <a:gd name="T11" fmla="*/ 1298 h 1298"/>
+              <a:gd name="T12" fmla="*/ 1333 w 1333"/>
+              <a:gd name="T13" fmla="*/ 1031 h 1298"/>
+            </a:gdLst>
+            <a:ahLst/>
+            <a:cxnLst>
+              <a:cxn ang="0">
+                <a:pos x="T0" y="T1"/>
+              </a:cxn>
+              <a:cxn ang="0">
+                <a:pos x="T2" y="T3"/>
+              </a:cxn>
+              <a:cxn ang="0">
+                <a:pos x="T4" y="T5"/>
+              </a:cxn>
+              <a:cxn ang="0">
+                <a:pos x="T6" y="T7"/>
+              </a:cxn>
+              <a:cxn ang="0">
+                <a:pos x="T8" y="T9"/>
+              </a:cxn>
+              <a:cxn ang="0">
+                <a:pos x="T10" y="T11"/>
+              </a:cxn>
+              <a:cxn ang="0">
+                <a:pos x="T12" y="T13"/>
+              </a:cxn>
+            </a:cxnLst>
+            <a:rect l="0" t="0" r="r" b="b"/>
+            <a:pathLst>
+              <a:path w="1333" h="1298">
+                <a:moveTo>
+                  <a:pt x="1333" y="1031"/>
+                </a:moveTo>
+                <a:cubicBezTo>
+                  <a:pt x="1333" y="380"/>
+                  <a:pt x="1333" y="380"/>
+                  <a:pt x="1333" y="380"/>
+                </a:cubicBezTo>
+                <a:cubicBezTo>
+                  <a:pt x="1215" y="154"/>
+                  <a:pt x="979" y="0"/>
+                  <a:pt x="706" y="0"/>
+                </a:cubicBezTo>
+                <a:cubicBezTo>
+                  <a:pt x="317" y="0"/>
+                  <a:pt x="0" y="316"/>
+                  <a:pt x="0" y="706"/>
+                </a:cubicBezTo>
+                <a:cubicBezTo>
+                  <a:pt x="0" y="954"/>
+                  <a:pt x="129" y="1172"/>
+                  <a:pt x="323" y="1298"/>
+                </a:cubicBezTo>
+                <a:cubicBezTo>
+                  <a:pt x="1090" y="1298"/>
+                  <a:pt x="1090" y="1298"/>
+                  <a:pt x="1090" y="1298"/>
+                </a:cubicBezTo>
+                <a:cubicBezTo>
+                  <a:pt x="1193" y="1232"/>
+                  <a:pt x="1276" y="1140"/>
+                  <a:pt x="1333" y="1031"/>
+                </a:cubicBezTo>
+                <a:close/>
+              </a:path>
+            </a:pathLst>
+          </a:custGeom>
+          <a:solidFill>
+            <a:schemeClr val="bg1">
+              <a:alpha val="75000"/>
+            </a:schemeClr>
+          </a:solidFill>
+          <a:ln w="50800" cap="sq" cmpd="dbl">
+            <a:noFill/>
+            <a:miter lim="800000"/>
+          </a:ln>
+          <a:effectLst/>
+          <a:extLst/>
+        </p:spPr>
+        <p:txBody>
+          <a:bodyPr vert="horz" lIns="91440" tIns="45720" rIns="91440" bIns="45720" rtlCol="0" anchor="t">
+            <a:normAutofit/>
+          </a:bodyPr>
+          <a:lstStyle/>
+          <a:p>
+            <a:pPr algn="ctr">
+              <a:spcAft>
+                <a:spcPts val="1000"/>
+              </a:spcAft>
+              <a:buClr>
+                <a:schemeClr val="tx1"/>
+              </a:buClr>
+              <a:buSzPct val="100000"/>
+              <a:buFont typeface="Arial"/>
+              <a:buNone/>
+            </a:pPr>
+            <a:endParaRPr lang="en-US" sz="1600" cap="all"/>
+          </a:p>
+        </p:txBody>
+      </p:sp>
+      <p:sp>
+        <p:nvSpPr>
+          <p:cNvPr id="2" name="Titel 1">
+            <a:extLst>
+              <a:ext uri="{FF2B5EF4-FFF2-40B4-BE49-F238E27FC236}">
+                <a16:creationId xmlns:a16="http://schemas.microsoft.com/office/drawing/2014/main" id="{9F911658-3497-45FE-B8DE-51AAAA6C7586}"/>
+              </a:ext>
+            </a:extLst>
+          </p:cNvPr>
+          <p:cNvSpPr>
+            <a:spLocks noGrp="1"/>
+          </p:cNvSpPr>
+          <p:nvPr>
+            <p:ph type="title"/>
+          </p:nvPr>
+        </p:nvSpPr>
         <p:spPr>
           <a:xfrm>
-            <a:off x="1" y="0"/>
-            <a:ext cx="6090572" cy="6858000"/>
+            <a:off x="709448" y="1913950"/>
+            <a:ext cx="4204137" cy="1342754"/>
           </a:xfrm>
-          <a:prstGeom prst="rect">
+        </p:spPr>
+        <p:txBody>
+          <a:bodyPr>
+            <a:normAutofit/>
+          </a:bodyPr>
+          <a:lstStyle/>
+          <a:p>
+            <a:pPr algn="ctr"/>
+            <a:r>
+              <a:rPr lang="en-GB" sz="3600"/>
+              <a:t>Lessons Learned</a:t>
+            </a:r>
+          </a:p>
+        </p:txBody>
+      </p:sp>
+      <p:cxnSp>
+        <p:nvCxnSpPr>
+          <p:cNvPr id="59" name="Straight Connector 58">
+            <a:extLst>
+              <a:ext uri="{FF2B5EF4-FFF2-40B4-BE49-F238E27FC236}">
+                <a16:creationId xmlns:a16="http://schemas.microsoft.com/office/drawing/2014/main" id="{20E3A342-4D61-4E3F-AF90-1AB42AEB96CC}"/>
+              </a:ext>
+              <a:ext uri="{C183D7F6-B498-43B3-948B-1728B52AA6E4}">
+                <adec:decorative xmlns:adec="http://schemas.microsoft.com/office/drawing/2017/decorative" val="1"/>
+              </a:ext>
+            </a:extLst>
+          </p:cNvPr>
+          <p:cNvCxnSpPr>
+            <a:cxnSpLocks noGrp="1" noRot="1" noChangeAspect="1" noMove="1" noResize="1" noEditPoints="1" noAdjustHandles="1" noChangeArrowheads="1" noChangeShapeType="1"/>
+          </p:cNvCxnSpPr>
+          <p:nvPr>
+            <p:extLst>
+              <p:ext uri="{386F3935-93C4-4BCD-93E2-E3B085C9AB24}">
+                <p16:designElem xmlns:p16="http://schemas.microsoft.com/office/powerpoint/2015/main" val="1"/>
+              </p:ext>
+            </p:extLst>
+          </p:nvPr>
+        </p:nvCxnSpPr>
+        <p:spPr>
+          <a:xfrm>
+            <a:off x="2287051" y="3337139"/>
+            <a:ext cx="935420" cy="0"/>
+          </a:xfrm>
+          <a:prstGeom prst="line">
             <a:avLst/>
           </a:prstGeom>
-          <a:gradFill>
-            <a:gsLst>
-              <a:gs pos="0">
-                <a:schemeClr val="accent6">
-                  <a:lumMod val="90000"/>
-                </a:schemeClr>
-              </a:gs>
-              <a:gs pos="25000">
-                <a:schemeClr val="accent6">
-                  <a:lumMod val="90000"/>
-                </a:schemeClr>
-              </a:gs>
-              <a:gs pos="94000">
-                <a:schemeClr val="bg2">
-                  <a:lumMod val="25000"/>
-                </a:schemeClr>
-              </a:gs>
-              <a:gs pos="100000">
-                <a:schemeClr val="bg2">
-                  <a:lumMod val="25000"/>
-                </a:schemeClr>
-              </a:gs>
-            </a:gsLst>
-            <a:lin ang="4200000" scaled="0"/>
-          </a:gradFill>
-          <a:ln>
-            <a:noFill/>
+          <a:ln w="25400" cap="sq">
+            <a:solidFill>
+              <a:schemeClr val="tx1">
+                <a:lumMod val="85000"/>
+                <a:lumOff val="15000"/>
+              </a:schemeClr>
+            </a:solidFill>
+            <a:bevel/>
           </a:ln>
         </p:spPr>
         <p:style>
-          <a:lnRef idx="2">
-            <a:schemeClr val="accent1">
-              <a:shade val="50000"/>
-            </a:schemeClr>
+          <a:lnRef idx="1">
+            <a:schemeClr val="accent1"/>
           </a:lnRef>
-          <a:fillRef idx="1">
+          <a:fillRef idx="0">
             <a:schemeClr val="accent1"/>
           </a:fillRef>
           <a:effectRef idx="0">
             <a:schemeClr val="accent1"/>
           </a:effectRef>
           <a:fontRef idx="minor">
-            <a:schemeClr val="lt1"/>
+            <a:schemeClr val="tx1"/>
           </a:fontRef>
         </p:style>
-        <p:txBody>
-          <a:bodyPr rtlCol="0" anchor="ctr"/>
-          <a:lstStyle/>
-          <a:p>
-            <a:pPr algn="ctr"/>
-            <a:endParaRPr lang="en-US"/>
-          </a:p>
-        </p:txBody>
-      </p:sp>
+      </p:cxnSp>
+      <p:sp>
+        <p:nvSpPr>
+          <p:cNvPr id="10" name="Content Placeholder 9">
+            <a:extLst>
+              <a:ext uri="{FF2B5EF4-FFF2-40B4-BE49-F238E27FC236}">
+                <a16:creationId xmlns:a16="http://schemas.microsoft.com/office/drawing/2014/main" id="{2CB2D89F-CCCF-4F2B-9968-21C18C3406DE}"/>
+              </a:ext>
+            </a:extLst>
+          </p:cNvPr>
+          <p:cNvSpPr>
+            <a:spLocks noGrp="1"/>
+          </p:cNvSpPr>
+          <p:nvPr>
+            <p:ph idx="1"/>
+          </p:nvPr>
+        </p:nvSpPr>
+        <p:spPr>
+          <a:xfrm>
+            <a:off x="525516" y="3417573"/>
+            <a:ext cx="4593021" cy="2619839"/>
+          </a:xfrm>
+        </p:spPr>
+        <p:txBody>
+          <a:bodyPr anchor="ctr">
+            <a:normAutofit/>
+          </a:bodyPr>
+          <a:lstStyle/>
+          <a:p>
+            <a:r>
+              <a:rPr lang="en-US" sz="1800"/>
+              <a:t>Code-and-Fix</a:t>
+            </a:r>
+          </a:p>
+          <a:p>
+            <a:r>
+              <a:rPr lang="en-US" sz="1800"/>
+              <a:t>More Brainstorming</a:t>
+            </a:r>
+          </a:p>
+          <a:p>
+            <a:r>
+              <a:rPr lang="en-US" sz="1800"/>
+              <a:t>Take notes</a:t>
+            </a:r>
+          </a:p>
+          <a:p>
+            <a:endParaRPr lang="en-US" sz="1800"/>
+          </a:p>
+        </p:txBody>
+      </p:sp>
+    </p:spTree>
+    <p:extLst>
+      <p:ext uri="{BB962C8B-B14F-4D97-AF65-F5344CB8AC3E}">
+        <p14:creationId xmlns:p14="http://schemas.microsoft.com/office/powerpoint/2010/main" val="1157231479"/>
+      </p:ext>
+    </p:extLst>
+  </p:cSld>
+  <p:clrMapOvr>
+    <a:masterClrMapping/>
+  </p:clrMapOvr>
+  <mc:AlternateContent xmlns:mc="http://schemas.openxmlformats.org/markup-compatibility/2006" xmlns:p14="http://schemas.microsoft.com/office/powerpoint/2010/main">
+    <mc:Choice Requires="p14">
+      <p:transition spd="slow" p14:dur="2000" advTm="647"/>
+    </mc:Choice>
+    <mc:Fallback xmlns="">
+      <p:transition spd="slow" advTm="647"/>
+    </mc:Fallback>
+  </mc:AlternateContent>
+</p:sld>
+</file>
+
+<file path=ppt/slides/slide8.xml><?xml version="1.0" encoding="utf-8"?>
+<p:sld xmlns:a="http://schemas.openxmlformats.org/drawingml/2006/main" xmlns:r="http://schemas.openxmlformats.org/officeDocument/2006/relationships" xmlns:p="http://schemas.openxmlformats.org/presentationml/2006/main">
+  <p:cSld>
+    <p:bg>
+      <p:bgPr>
+        <a:solidFill>
+          <a:schemeClr val="bg1"/>
+        </a:solidFill>
+        <a:effectLst/>
+      </p:bgPr>
+    </p:bg>
+    <p:spTree>
+      <p:nvGrpSpPr>
+        <p:cNvPr id="1" name=""/>
+        <p:cNvGrpSpPr/>
+        <p:nvPr/>
+      </p:nvGrpSpPr>
+      <p:grpSpPr>
+        <a:xfrm>
+          <a:off x="0" y="0"/>
+          <a:ext cx="0" cy="0"/>
+          <a:chOff x="0" y="0"/>
+          <a:chExt cx="0" cy="0"/>
+        </a:xfrm>
+      </p:grpSpPr>
       <p:pic>
         <p:nvPicPr>
-          <p:cNvPr id="17" name="Picture 16">
-            <a:extLst>
-              <a:ext uri="{FF2B5EF4-FFF2-40B4-BE49-F238E27FC236}">
-                <a16:creationId xmlns:a16="http://schemas.microsoft.com/office/drawing/2014/main" id="{2897127E-6CEF-446C-BE87-93B7C46E49D1}"/>
-              </a:ext>
-              <a:ext uri="{C183D7F6-B498-43B3-948B-1728B52AA6E4}">
-                <adec:decorative xmlns:adec="http://schemas.microsoft.com/office/drawing/2017/decorative" val="1"/>
+          <p:cNvPr id="5" name="Inhaltsplatzhalter 4" descr="Ein Bild, das Boden, drinnen, rot, sitzend enthält.&#10;&#10;Mit sehr hoher Zuverlässigkeit generierte Beschreibung">
+            <a:extLst>
+              <a:ext uri="{FF2B5EF4-FFF2-40B4-BE49-F238E27FC236}">
+                <a16:creationId xmlns:a16="http://schemas.microsoft.com/office/drawing/2014/main" id="{1D14ED3A-4550-4139-B080-E931333EAECC}"/>
               </a:ext>
             </a:extLst>
           </p:cNvPr>
           <p:cNvPicPr>
-            <a:picLocks noGrp="1" noRot="1" noChangeAspect="1" noMove="1" noResize="1" noEditPoints="1" noAdjustHandles="1" noChangeArrowheads="1" noChangeShapeType="1" noCrop="1"/>
+            <a:picLocks noGrp="1" noChangeAspect="1"/>
           </p:cNvPicPr>
           <p:nvPr>
-            <p:extLst>
-              <p:ext uri="{386F3935-93C4-4BCD-93E2-E3B085C9AB24}">
-                <p16:designElem xmlns:p16="http://schemas.microsoft.com/office/powerpoint/2015/main" val="1"/>
-              </p:ext>
-            </p:extLst>
+            <p:ph idx="1"/>
           </p:nvPr>
         </p:nvPicPr>
-        <p:blipFill>
+        <p:blipFill rotWithShape="1">
           <a:blip r:embed="rId2">
             <a:extLst>
               <a:ext uri="{28A0092B-C50C-407E-A947-70E740481C1C}">
@@ -5642,14 +5673,13 @@
               </a:ext>
             </a:extLst>
           </a:blip>
-          <a:stretch>
-            <a:fillRect/>
-          </a:stretch>
+          <a:srcRect t="16497" b="8503"/>
+          <a:stretch/>
         </p:blipFill>
         <p:spPr>
           <a:xfrm>
-            <a:off x="0" y="0"/>
-            <a:ext cx="12192000" cy="6858000"/>
+            <a:off x="20" y="10"/>
+            <a:ext cx="12191980" cy="6857990"/>
           </a:xfrm>
           <a:prstGeom prst="rect">
             <a:avLst/>
@@ -5658,6 +5688,149 @@
       </p:pic>
       <p:sp>
         <p:nvSpPr>
+          <p:cNvPr id="29" name="Freeform 5">
+            <a:extLst>
+              <a:ext uri="{FF2B5EF4-FFF2-40B4-BE49-F238E27FC236}">
+                <a16:creationId xmlns:a16="http://schemas.microsoft.com/office/drawing/2014/main" id="{87CC2527-562A-4F69-B487-4371E5B243E7}"/>
+              </a:ext>
+              <a:ext uri="{C183D7F6-B498-43B3-948B-1728B52AA6E4}">
+                <adec:decorative xmlns:adec="http://schemas.microsoft.com/office/drawing/2017/decorative" val="1"/>
+              </a:ext>
+            </a:extLst>
+          </p:cNvPr>
+          <p:cNvSpPr>
+            <a:spLocks noGrp="1" noRot="1" noChangeAspect="1" noMove="1" noResize="1" noEditPoints="1" noAdjustHandles="1" noChangeArrowheads="1" noChangeShapeType="1" noTextEdit="1"/>
+          </p:cNvSpPr>
+          <p:nvPr>
+            <p:extLst>
+              <p:ext uri="{386F3935-93C4-4BCD-93E2-E3B085C9AB24}">
+                <p16:designElem xmlns:p16="http://schemas.microsoft.com/office/powerpoint/2015/main" val="1"/>
+              </p:ext>
+            </p:extLst>
+          </p:nvPr>
+        </p:nvSpPr>
+        <p:spPr bwMode="grayWhite">
+          <a:xfrm>
+            <a:off x="7488621" y="2277613"/>
+            <a:ext cx="4703379" cy="4580387"/>
+          </a:xfrm>
+          <a:custGeom>
+            <a:avLst/>
+            <a:gdLst>
+              <a:gd name="T0" fmla="*/ 1333 w 1333"/>
+              <a:gd name="T1" fmla="*/ 1031 h 1298"/>
+              <a:gd name="T2" fmla="*/ 1333 w 1333"/>
+              <a:gd name="T3" fmla="*/ 380 h 1298"/>
+              <a:gd name="T4" fmla="*/ 706 w 1333"/>
+              <a:gd name="T5" fmla="*/ 0 h 1298"/>
+              <a:gd name="T6" fmla="*/ 0 w 1333"/>
+              <a:gd name="T7" fmla="*/ 706 h 1298"/>
+              <a:gd name="T8" fmla="*/ 323 w 1333"/>
+              <a:gd name="T9" fmla="*/ 1298 h 1298"/>
+              <a:gd name="T10" fmla="*/ 1090 w 1333"/>
+              <a:gd name="T11" fmla="*/ 1298 h 1298"/>
+              <a:gd name="T12" fmla="*/ 1333 w 1333"/>
+              <a:gd name="T13" fmla="*/ 1031 h 1298"/>
+            </a:gdLst>
+            <a:ahLst/>
+            <a:cxnLst>
+              <a:cxn ang="0">
+                <a:pos x="T0" y="T1"/>
+              </a:cxn>
+              <a:cxn ang="0">
+                <a:pos x="T2" y="T3"/>
+              </a:cxn>
+              <a:cxn ang="0">
+                <a:pos x="T4" y="T5"/>
+              </a:cxn>
+              <a:cxn ang="0">
+                <a:pos x="T6" y="T7"/>
+              </a:cxn>
+              <a:cxn ang="0">
+                <a:pos x="T8" y="T9"/>
+              </a:cxn>
+              <a:cxn ang="0">
+                <a:pos x="T10" y="T11"/>
+              </a:cxn>
+              <a:cxn ang="0">
+                <a:pos x="T12" y="T13"/>
+              </a:cxn>
+            </a:cxnLst>
+            <a:rect l="0" t="0" r="r" b="b"/>
+            <a:pathLst>
+              <a:path w="1333" h="1298">
+                <a:moveTo>
+                  <a:pt x="1333" y="1031"/>
+                </a:moveTo>
+                <a:cubicBezTo>
+                  <a:pt x="1333" y="380"/>
+                  <a:pt x="1333" y="380"/>
+                  <a:pt x="1333" y="380"/>
+                </a:cubicBezTo>
+                <a:cubicBezTo>
+                  <a:pt x="1215" y="154"/>
+                  <a:pt x="979" y="0"/>
+                  <a:pt x="706" y="0"/>
+                </a:cubicBezTo>
+                <a:cubicBezTo>
+                  <a:pt x="317" y="0"/>
+                  <a:pt x="0" y="316"/>
+                  <a:pt x="0" y="706"/>
+                </a:cubicBezTo>
+                <a:cubicBezTo>
+                  <a:pt x="0" y="954"/>
+                  <a:pt x="129" y="1172"/>
+                  <a:pt x="323" y="1298"/>
+                </a:cubicBezTo>
+                <a:cubicBezTo>
+                  <a:pt x="1090" y="1298"/>
+                  <a:pt x="1090" y="1298"/>
+                  <a:pt x="1090" y="1298"/>
+                </a:cubicBezTo>
+                <a:cubicBezTo>
+                  <a:pt x="1193" y="1232"/>
+                  <a:pt x="1276" y="1140"/>
+                  <a:pt x="1333" y="1031"/>
+                </a:cubicBezTo>
+                <a:close/>
+              </a:path>
+            </a:pathLst>
+          </a:custGeom>
+          <a:solidFill>
+            <a:schemeClr val="bg1">
+              <a:alpha val="70000"/>
+            </a:schemeClr>
+          </a:solidFill>
+          <a:ln w="50800" cap="sq" cmpd="dbl">
+            <a:noFill/>
+            <a:miter lim="800000"/>
+          </a:ln>
+          <a:effectLst/>
+          <a:extLst/>
+        </p:spPr>
+        <p:txBody>
+          <a:bodyPr vert="horz" lIns="91440" tIns="45720" rIns="91440" bIns="45720" rtlCol="0" anchor="t">
+            <a:normAutofit/>
+          </a:bodyPr>
+          <a:lstStyle/>
+          <a:p>
+            <a:pPr algn="ctr">
+              <a:spcAft>
+                <a:spcPts val="1000"/>
+              </a:spcAft>
+              <a:buClr>
+                <a:schemeClr val="tx1"/>
+              </a:buClr>
+              <a:buSzPct val="100000"/>
+              <a:buFont typeface="Arial"/>
+              <a:buNone/>
+            </a:pPr>
+            <a:endParaRPr lang="en-US" sz="1600" cap="all"/>
+          </a:p>
+        </p:txBody>
+      </p:sp>
+      <p:sp>
+        <p:nvSpPr>
           <p:cNvPr id="2" name="Titel 1">
             <a:extLst>
               <a:ext uri="{FF2B5EF4-FFF2-40B4-BE49-F238E27FC236}">
@@ -5674,63 +5847,80 @@
         </p:nvSpPr>
         <p:spPr>
           <a:xfrm>
-            <a:off x="640079" y="2053641"/>
-            <a:ext cx="3669161" cy="2760098"/>
+            <a:off x="8022021" y="3231931"/>
+            <a:ext cx="3852041" cy="1834056"/>
           </a:xfrm>
         </p:spPr>
         <p:txBody>
-          <a:bodyPr>
+          <a:bodyPr vert="horz" lIns="91440" tIns="45720" rIns="91440" bIns="45720" rtlCol="0" anchor="b">
             <a:normAutofit/>
           </a:bodyPr>
           <a:lstStyle/>
           <a:p>
-            <a:r>
-              <a:rPr lang="en-GB">
-                <a:solidFill>
-                  <a:srgbClr val="FFFFFF"/>
-                </a:solidFill>
-              </a:rPr>
+            <a:pPr algn="ctr"/>
+            <a:r>
+              <a:rPr lang="en-US" sz="4000"/>
               <a:t>Questions?</a:t>
             </a:r>
           </a:p>
         </p:txBody>
       </p:sp>
-      <p:sp>
-        <p:nvSpPr>
-          <p:cNvPr id="4" name="Inhaltsplatzhalter 3">
-            <a:extLst>
-              <a:ext uri="{FF2B5EF4-FFF2-40B4-BE49-F238E27FC236}">
-                <a16:creationId xmlns:a16="http://schemas.microsoft.com/office/drawing/2014/main" id="{55DDF708-3964-4A4A-8DDD-4F4C6AE96CE1}"/>
-              </a:ext>
-            </a:extLst>
-          </p:cNvPr>
-          <p:cNvSpPr>
-            <a:spLocks noGrp="1"/>
-          </p:cNvSpPr>
-          <p:nvPr>
-            <p:ph idx="1"/>
-          </p:nvPr>
-        </p:nvSpPr>
+      <p:cxnSp>
+        <p:nvCxnSpPr>
+          <p:cNvPr id="31" name="Straight Connector 30">
+            <a:extLst>
+              <a:ext uri="{FF2B5EF4-FFF2-40B4-BE49-F238E27FC236}">
+                <a16:creationId xmlns:a16="http://schemas.microsoft.com/office/drawing/2014/main" id="{BCDAEC91-5BCE-4B55-9CC0-43EF94CB734B}"/>
+              </a:ext>
+              <a:ext uri="{C183D7F6-B498-43B3-948B-1728B52AA6E4}">
+                <adec:decorative xmlns:adec="http://schemas.microsoft.com/office/drawing/2017/decorative" val="1"/>
+              </a:ext>
+            </a:extLst>
+          </p:cNvPr>
+          <p:cNvCxnSpPr>
+            <a:cxnSpLocks noGrp="1" noRot="1" noChangeAspect="1" noMove="1" noResize="1" noEditPoints="1" noAdjustHandles="1" noChangeArrowheads="1" noChangeShapeType="1"/>
+          </p:cNvCxnSpPr>
+          <p:nvPr>
+            <p:extLst>
+              <p:ext uri="{386F3935-93C4-4BCD-93E2-E3B085C9AB24}">
+                <p16:designElem xmlns:p16="http://schemas.microsoft.com/office/powerpoint/2015/main" val="1"/>
+              </p:ext>
+            </p:extLst>
+          </p:nvPr>
+        </p:nvCxnSpPr>
         <p:spPr>
           <a:xfrm>
-            <a:off x="6090574" y="801866"/>
-            <a:ext cx="5306084" cy="5230634"/>
+            <a:off x="9480331" y="5123793"/>
+            <a:ext cx="935420" cy="0"/>
           </a:xfrm>
+          <a:prstGeom prst="line">
+            <a:avLst/>
+          </a:prstGeom>
+          <a:ln w="25400" cap="sq">
+            <a:solidFill>
+              <a:schemeClr val="tx1">
+                <a:lumMod val="85000"/>
+                <a:lumOff val="15000"/>
+              </a:schemeClr>
+            </a:solidFill>
+            <a:bevel/>
+          </a:ln>
         </p:spPr>
-        <p:txBody>
-          <a:bodyPr anchor="ctr">
-            <a:normAutofit/>
-          </a:bodyPr>
-          <a:lstStyle/>
-          <a:p>
-            <a:endParaRPr lang="en-GB" sz="2400">
-              <a:solidFill>
-                <a:srgbClr val="000000"/>
-              </a:solidFill>
-            </a:endParaRPr>
-          </a:p>
-        </p:txBody>
-      </p:sp>
+        <p:style>
+          <a:lnRef idx="1">
+            <a:schemeClr val="accent1"/>
+          </a:lnRef>
+          <a:fillRef idx="0">
+            <a:schemeClr val="accent1"/>
+          </a:fillRef>
+          <a:effectRef idx="0">
+            <a:schemeClr val="accent1"/>
+          </a:effectRef>
+          <a:fontRef idx="minor">
+            <a:schemeClr val="tx1"/>
+          </a:fontRef>
+        </p:style>
+      </p:cxnSp>
     </p:spTree>
     <p:extLst>
       <p:ext uri="{BB962C8B-B14F-4D97-AF65-F5344CB8AC3E}">

</xml_diff>